<commit_message>
English translate for Images
</commit_message>
<xml_diff>
--- a/images/Image_maker.pptx
+++ b/images/Image_maker.pptx
@@ -267,7 +267,7 @@
           <a:p>
             <a:fld id="{E382C574-8341-433E-8278-D812E3904DB0}" type="datetimeFigureOut">
               <a:rPr lang="fr-FR" smtClean="0"/>
-              <a:t>03/12/2024</a:t>
+              <a:t>08/10/2025</a:t>
             </a:fld>
             <a:endParaRPr lang="fr-FR"/>
           </a:p>
@@ -467,7 +467,7 @@
           <a:p>
             <a:fld id="{E382C574-8341-433E-8278-D812E3904DB0}" type="datetimeFigureOut">
               <a:rPr lang="fr-FR" smtClean="0"/>
-              <a:t>03/12/2024</a:t>
+              <a:t>08/10/2025</a:t>
             </a:fld>
             <a:endParaRPr lang="fr-FR"/>
           </a:p>
@@ -677,7 +677,7 @@
           <a:p>
             <a:fld id="{E382C574-8341-433E-8278-D812E3904DB0}" type="datetimeFigureOut">
               <a:rPr lang="fr-FR" smtClean="0"/>
-              <a:t>03/12/2024</a:t>
+              <a:t>08/10/2025</a:t>
             </a:fld>
             <a:endParaRPr lang="fr-FR"/>
           </a:p>
@@ -877,7 +877,7 @@
           <a:p>
             <a:fld id="{E382C574-8341-433E-8278-D812E3904DB0}" type="datetimeFigureOut">
               <a:rPr lang="fr-FR" smtClean="0"/>
-              <a:t>03/12/2024</a:t>
+              <a:t>08/10/2025</a:t>
             </a:fld>
             <a:endParaRPr lang="fr-FR"/>
           </a:p>
@@ -1153,7 +1153,7 @@
           <a:p>
             <a:fld id="{E382C574-8341-433E-8278-D812E3904DB0}" type="datetimeFigureOut">
               <a:rPr lang="fr-FR" smtClean="0"/>
-              <a:t>03/12/2024</a:t>
+              <a:t>08/10/2025</a:t>
             </a:fld>
             <a:endParaRPr lang="fr-FR"/>
           </a:p>
@@ -1421,7 +1421,7 @@
           <a:p>
             <a:fld id="{E382C574-8341-433E-8278-D812E3904DB0}" type="datetimeFigureOut">
               <a:rPr lang="fr-FR" smtClean="0"/>
-              <a:t>03/12/2024</a:t>
+              <a:t>08/10/2025</a:t>
             </a:fld>
             <a:endParaRPr lang="fr-FR"/>
           </a:p>
@@ -1836,7 +1836,7 @@
           <a:p>
             <a:fld id="{E382C574-8341-433E-8278-D812E3904DB0}" type="datetimeFigureOut">
               <a:rPr lang="fr-FR" smtClean="0"/>
-              <a:t>03/12/2024</a:t>
+              <a:t>08/10/2025</a:t>
             </a:fld>
             <a:endParaRPr lang="fr-FR"/>
           </a:p>
@@ -1978,7 +1978,7 @@
           <a:p>
             <a:fld id="{E382C574-8341-433E-8278-D812E3904DB0}" type="datetimeFigureOut">
               <a:rPr lang="fr-FR" smtClean="0"/>
-              <a:t>03/12/2024</a:t>
+              <a:t>08/10/2025</a:t>
             </a:fld>
             <a:endParaRPr lang="fr-FR"/>
           </a:p>
@@ -2091,7 +2091,7 @@
           <a:p>
             <a:fld id="{E382C574-8341-433E-8278-D812E3904DB0}" type="datetimeFigureOut">
               <a:rPr lang="fr-FR" smtClean="0"/>
-              <a:t>03/12/2024</a:t>
+              <a:t>08/10/2025</a:t>
             </a:fld>
             <a:endParaRPr lang="fr-FR"/>
           </a:p>
@@ -2404,7 +2404,7 @@
           <a:p>
             <a:fld id="{E382C574-8341-433E-8278-D812E3904DB0}" type="datetimeFigureOut">
               <a:rPr lang="fr-FR" smtClean="0"/>
-              <a:t>03/12/2024</a:t>
+              <a:t>08/10/2025</a:t>
             </a:fld>
             <a:endParaRPr lang="fr-FR"/>
           </a:p>
@@ -2693,7 +2693,7 @@
           <a:p>
             <a:fld id="{E382C574-8341-433E-8278-D812E3904DB0}" type="datetimeFigureOut">
               <a:rPr lang="fr-FR" smtClean="0"/>
-              <a:t>03/12/2024</a:t>
+              <a:t>08/10/2025</a:t>
             </a:fld>
             <a:endParaRPr lang="fr-FR"/>
           </a:p>
@@ -2936,7 +2936,7 @@
           <a:p>
             <a:fld id="{E382C574-8341-433E-8278-D812E3904DB0}" type="datetimeFigureOut">
               <a:rPr lang="fr-FR" smtClean="0"/>
-              <a:t>03/12/2024</a:t>
+              <a:t>08/10/2025</a:t>
             </a:fld>
             <a:endParaRPr lang="fr-FR"/>
           </a:p>
@@ -5164,7 +5164,7 @@
         <p:spPr>
           <a:xfrm>
             <a:off x="4398672" y="267064"/>
-            <a:ext cx="3068597" cy="646331"/>
+            <a:ext cx="2576796" cy="646331"/>
           </a:xfrm>
           <a:prstGeom prst="rect">
             <a:avLst/>
@@ -5199,7 +5199,31 @@
                 <a:ea typeface="Cambria" panose="02040503050406030204" pitchFamily="18" charset="0"/>
                 <a:cs typeface="Times New Roman" panose="02020603050405020304" pitchFamily="18" charset="0"/>
               </a:rPr>
-              <a:t>: vecteur de sensibilités</a:t>
+              <a:t>: </a:t>
+            </a:r>
+            <a:r>
+              <a:rPr lang="fr-FR" sz="2000" dirty="0" err="1">
+                <a:latin typeface="Cambria" panose="02040503050406030204" pitchFamily="18" charset="0"/>
+                <a:ea typeface="Cambria" panose="02040503050406030204" pitchFamily="18" charset="0"/>
+                <a:cs typeface="Times New Roman" panose="02020603050405020304" pitchFamily="18" charset="0"/>
+              </a:rPr>
+              <a:t>sensitivity</a:t>
+            </a:r>
+            <a:r>
+              <a:rPr lang="fr-FR" sz="2000" dirty="0">
+                <a:latin typeface="Cambria" panose="02040503050406030204" pitchFamily="18" charset="0"/>
+                <a:ea typeface="Cambria" panose="02040503050406030204" pitchFamily="18" charset="0"/>
+                <a:cs typeface="Times New Roman" panose="02020603050405020304" pitchFamily="18" charset="0"/>
+              </a:rPr>
+              <a:t> </a:t>
+            </a:r>
+            <a:r>
+              <a:rPr lang="fr-FR" sz="2000" dirty="0" err="1">
+                <a:latin typeface="Cambria" panose="02040503050406030204" pitchFamily="18" charset="0"/>
+                <a:ea typeface="Cambria" panose="02040503050406030204" pitchFamily="18" charset="0"/>
+                <a:cs typeface="Times New Roman" panose="02020603050405020304" pitchFamily="18" charset="0"/>
+              </a:rPr>
+              <a:t>vector</a:t>
             </a:r>
             <a:endParaRPr lang="fr-FR" dirty="0">
               <a:latin typeface="Cambria" panose="02040503050406030204" pitchFamily="18" charset="0"/>
@@ -5270,7 +5294,7 @@
             <p:spPr>
               <a:xfrm>
                 <a:off x="1992139" y="2503039"/>
-                <a:ext cx="3471720" cy="655244"/>
+                <a:ext cx="3250698" cy="655244"/>
               </a:xfrm>
               <a:prstGeom prst="rect">
                 <a:avLst/>
@@ -5336,7 +5360,39 @@
                     <a:ea typeface="Cambria" panose="02040503050406030204" pitchFamily="18" charset="0"/>
                     <a:cs typeface="Times New Roman" panose="02020603050405020304" pitchFamily="18" charset="0"/>
                   </a:rPr>
-                  <a:t> sous-vecteur de sensibilités, </a:t>
+                  <a:t> </a:t>
+                </a:r>
+                <a:r>
+                  <a:rPr lang="fr-FR" i="1" dirty="0" err="1">
+                    <a:latin typeface="Cambria" panose="02040503050406030204" pitchFamily="18" charset="0"/>
+                    <a:ea typeface="Cambria" panose="02040503050406030204" pitchFamily="18" charset="0"/>
+                    <a:cs typeface="Times New Roman" panose="02020603050405020304" pitchFamily="18" charset="0"/>
+                  </a:rPr>
+                  <a:t>sub-vector</a:t>
+                </a:r>
+                <a:r>
+                  <a:rPr lang="fr-FR" i="1" dirty="0">
+                    <a:latin typeface="Cambria" panose="02040503050406030204" pitchFamily="18" charset="0"/>
+                    <a:ea typeface="Cambria" panose="02040503050406030204" pitchFamily="18" charset="0"/>
+                    <a:cs typeface="Times New Roman" panose="02020603050405020304" pitchFamily="18" charset="0"/>
+                  </a:rPr>
+                  <a:t> of </a:t>
+                </a:r>
+                <a:r>
+                  <a:rPr lang="fr-FR" i="1" dirty="0" err="1">
+                    <a:latin typeface="Cambria" panose="02040503050406030204" pitchFamily="18" charset="0"/>
+                    <a:ea typeface="Cambria" panose="02040503050406030204" pitchFamily="18" charset="0"/>
+                    <a:cs typeface="Times New Roman" panose="02020603050405020304" pitchFamily="18" charset="0"/>
+                  </a:rPr>
+                  <a:t>sensitivities</a:t>
+                </a:r>
+                <a:r>
+                  <a:rPr lang="fr-FR" i="1" dirty="0">
+                    <a:latin typeface="Cambria" panose="02040503050406030204" pitchFamily="18" charset="0"/>
+                    <a:ea typeface="Cambria" panose="02040503050406030204" pitchFamily="18" charset="0"/>
+                    <a:cs typeface="Times New Roman" panose="02020603050405020304" pitchFamily="18" charset="0"/>
+                  </a:rPr>
+                  <a:t>, </a:t>
                 </a:r>
               </a:p>
               <a:p>
@@ -5346,7 +5402,23 @@
                     <a:ea typeface="Cambria" panose="02040503050406030204" pitchFamily="18" charset="0"/>
                     <a:cs typeface="Times New Roman" panose="02020603050405020304" pitchFamily="18" charset="0"/>
                   </a:rPr>
-                  <a:t>pour un isotope i et une réaction r.</a:t>
+                  <a:t>for a isotope i and a </a:t>
+                </a:r>
+                <a:r>
+                  <a:rPr lang="fr-FR" i="1" dirty="0" err="1">
+                    <a:latin typeface="Cambria" panose="02040503050406030204" pitchFamily="18" charset="0"/>
+                    <a:ea typeface="Cambria" panose="02040503050406030204" pitchFamily="18" charset="0"/>
+                    <a:cs typeface="Times New Roman" panose="02020603050405020304" pitchFamily="18" charset="0"/>
+                  </a:rPr>
+                  <a:t>reaction</a:t>
+                </a:r>
+                <a:r>
+                  <a:rPr lang="fr-FR" i="1" dirty="0">
+                    <a:latin typeface="Cambria" panose="02040503050406030204" pitchFamily="18" charset="0"/>
+                    <a:ea typeface="Cambria" panose="02040503050406030204" pitchFamily="18" charset="0"/>
+                    <a:cs typeface="Times New Roman" panose="02020603050405020304" pitchFamily="18" charset="0"/>
+                  </a:rPr>
+                  <a:t> r.</a:t>
                 </a:r>
               </a:p>
             </p:txBody>
@@ -5370,7 +5442,7 @@
             <p:spPr>
               <a:xfrm>
                 <a:off x="1992139" y="2503039"/>
-                <a:ext cx="3471720" cy="655244"/>
+                <a:ext cx="3250698" cy="655244"/>
               </a:xfrm>
               <a:prstGeom prst="rect">
                 <a:avLst/>
@@ -5378,7 +5450,7 @@
               <a:blipFill>
                 <a:blip r:embed="rId3"/>
                 <a:stretch>
-                  <a:fillRect l="-1582" t="-4673" r="-527" b="-14019"/>
+                  <a:fillRect l="-1689" t="-4673" r="-563" b="-14019"/>
                 </a:stretch>
               </a:blipFill>
             </p:spPr>
@@ -5387,7 +5459,7 @@
               <a:lstStyle/>
               <a:p>
                 <a:r>
-                  <a:rPr lang="fr-FR">
+                  <a:rPr lang="en-US">
                     <a:noFill/>
                   </a:rPr>
                   <a:t> </a:t>
@@ -5550,7 +5622,7 @@
             <p:spPr>
               <a:xfrm>
                 <a:off x="2751288" y="3789170"/>
-                <a:ext cx="6096000" cy="2140073"/>
+                <a:ext cx="6230342" cy="1842107"/>
               </a:xfrm>
               <a:prstGeom prst="rect">
                 <a:avLst/>
@@ -5770,7 +5842,7 @@
                     <a:ea typeface="Cambria" panose="02040503050406030204" pitchFamily="18" charset="0"/>
                     <a:cs typeface="Times New Roman" panose="02020603050405020304" pitchFamily="18" charset="0"/>
                   </a:rPr>
-                  <a:t>: variation du k</a:t>
+                  <a:t>: variation of k</a:t>
                 </a:r>
                 <a:r>
                   <a:rPr lang="fr-FR" sz="1800" i="1" kern="100" baseline="-25000" dirty="0">
@@ -5815,7 +5887,7 @@
                     <a:ea typeface="Cambria" panose="02040503050406030204" pitchFamily="18" charset="0"/>
                     <a:cs typeface="Times New Roman" panose="02020603050405020304" pitchFamily="18" charset="0"/>
                   </a:rPr>
-                  <a:t>en %</a:t>
+                  <a:t>in %</a:t>
                 </a:r>
                 <a:r>
                   <a:rPr lang="fr-FR" sz="1800" i="1" kern="100" dirty="0">
@@ -5824,7 +5896,43 @@
                     <a:ea typeface="Cambria" panose="02040503050406030204" pitchFamily="18" charset="0"/>
                     <a:cs typeface="Times New Roman" panose="02020603050405020304" pitchFamily="18" charset="0"/>
                   </a:rPr>
-                  <a:t>, induite par la variation de la section efficace microscopique (∆XS) </a:t>
+                  <a:t>, </a:t>
+                </a:r>
+                <a:r>
+                  <a:rPr lang="fr-FR" sz="1800" i="1" kern="100" dirty="0" err="1">
+                    <a:effectLst/>
+                    <a:latin typeface="Cambria" panose="02040503050406030204" pitchFamily="18" charset="0"/>
+                    <a:ea typeface="Cambria" panose="02040503050406030204" pitchFamily="18" charset="0"/>
+                    <a:cs typeface="Times New Roman" panose="02020603050405020304" pitchFamily="18" charset="0"/>
+                  </a:rPr>
+                  <a:t>induced</a:t>
+                </a:r>
+                <a:r>
+                  <a:rPr lang="fr-FR" sz="1800" i="1" kern="100" dirty="0">
+                    <a:effectLst/>
+                    <a:latin typeface="Cambria" panose="02040503050406030204" pitchFamily="18" charset="0"/>
+                    <a:ea typeface="Cambria" panose="02040503050406030204" pitchFamily="18" charset="0"/>
+                    <a:cs typeface="Times New Roman" panose="02020603050405020304" pitchFamily="18" charset="0"/>
+                  </a:rPr>
+                  <a:t> by the variation of the </a:t>
+                </a:r>
+                <a:r>
+                  <a:rPr lang="fr-FR" sz="1800" i="1" kern="100" dirty="0" err="1">
+                    <a:effectLst/>
+                    <a:latin typeface="Cambria" panose="02040503050406030204" pitchFamily="18" charset="0"/>
+                    <a:ea typeface="Cambria" panose="02040503050406030204" pitchFamily="18" charset="0"/>
+                    <a:cs typeface="Times New Roman" panose="02020603050405020304" pitchFamily="18" charset="0"/>
+                  </a:rPr>
+                  <a:t>microscopic</a:t>
+                </a:r>
+                <a:r>
+                  <a:rPr lang="fr-FR" sz="1800" i="1" kern="100" dirty="0">
+                    <a:effectLst/>
+                    <a:latin typeface="Cambria" panose="02040503050406030204" pitchFamily="18" charset="0"/>
+                    <a:ea typeface="Cambria" panose="02040503050406030204" pitchFamily="18" charset="0"/>
+                    <a:cs typeface="Times New Roman" panose="02020603050405020304" pitchFamily="18" charset="0"/>
+                  </a:rPr>
+                  <a:t> cross section (∆XS) </a:t>
                 </a:r>
                 <a:r>
                   <a:rPr lang="fr-FR" sz="1800" b="1" i="1" kern="100" dirty="0">
@@ -5833,7 +5941,7 @@
                     <a:ea typeface="Cambria" panose="02040503050406030204" pitchFamily="18" charset="0"/>
                     <a:cs typeface="Times New Roman" panose="02020603050405020304" pitchFamily="18" charset="0"/>
                   </a:rPr>
-                  <a:t>en %</a:t>
+                  <a:t>in %</a:t>
                 </a:r>
                 <a:r>
                   <a:rPr lang="fr-FR" sz="1800" i="1" kern="100" dirty="0">
@@ -5842,15 +5950,16 @@
                     <a:ea typeface="Cambria" panose="02040503050406030204" pitchFamily="18" charset="0"/>
                     <a:cs typeface="Times New Roman" panose="02020603050405020304" pitchFamily="18" charset="0"/>
                   </a:rPr>
-                  <a:t> aussi, </a:t>
+                  <a:t> </a:t>
                 </a:r>
                 <a:r>
-                  <a:rPr lang="fr-FR" i="1" kern="100" dirty="0">
+                  <a:rPr lang="fr-FR" sz="1800" i="1" kern="100" dirty="0" err="1">
+                    <a:effectLst/>
                     <a:latin typeface="Cambria" panose="02040503050406030204" pitchFamily="18" charset="0"/>
                     <a:ea typeface="Cambria" panose="02040503050406030204" pitchFamily="18" charset="0"/>
                     <a:cs typeface="Times New Roman" panose="02020603050405020304" pitchFamily="18" charset="0"/>
                   </a:rPr>
-                  <a:t>de la</a:t>
+                  <a:t>too</a:t>
                 </a:r>
                 <a:r>
                   <a:rPr lang="fr-FR" sz="1800" i="1" kern="100" dirty="0">
@@ -5859,7 +5968,75 @@
                     <a:ea typeface="Cambria" panose="02040503050406030204" pitchFamily="18" charset="0"/>
                     <a:cs typeface="Times New Roman" panose="02020603050405020304" pitchFamily="18" charset="0"/>
                   </a:rPr>
-                  <a:t> réaction r de l’isotope i, dans un groupe d’énergie g</a:t>
+                  <a:t>, </a:t>
+                </a:r>
+                <a:r>
+                  <a:rPr lang="fr-FR" i="1" kern="100" dirty="0">
+                    <a:latin typeface="Cambria" panose="02040503050406030204" pitchFamily="18" charset="0"/>
+                    <a:ea typeface="Cambria" panose="02040503050406030204" pitchFamily="18" charset="0"/>
+                    <a:cs typeface="Times New Roman" panose="02020603050405020304" pitchFamily="18" charset="0"/>
+                  </a:rPr>
+                  <a:t>of </a:t>
+                </a:r>
+                <a:r>
+                  <a:rPr lang="fr-FR" sz="1800" i="1" kern="100" dirty="0" err="1">
+                    <a:effectLst/>
+                    <a:latin typeface="Cambria" panose="02040503050406030204" pitchFamily="18" charset="0"/>
+                    <a:ea typeface="Cambria" panose="02040503050406030204" pitchFamily="18" charset="0"/>
+                    <a:cs typeface="Times New Roman" panose="02020603050405020304" pitchFamily="18" charset="0"/>
+                  </a:rPr>
+                  <a:t>reaction</a:t>
+                </a:r>
+                <a:r>
+                  <a:rPr lang="fr-FR" sz="1800" i="1" kern="100" dirty="0">
+                    <a:effectLst/>
+                    <a:latin typeface="Cambria" panose="02040503050406030204" pitchFamily="18" charset="0"/>
+                    <a:ea typeface="Cambria" panose="02040503050406030204" pitchFamily="18" charset="0"/>
+                    <a:cs typeface="Times New Roman" panose="02020603050405020304" pitchFamily="18" charset="0"/>
+                  </a:rPr>
+                  <a:t> r for isotope i, </a:t>
+                </a:r>
+                <a:r>
+                  <a:rPr lang="fr-FR" i="1" kern="100" dirty="0">
+                    <a:latin typeface="Cambria" panose="02040503050406030204" pitchFamily="18" charset="0"/>
+                    <a:ea typeface="Cambria" panose="02040503050406030204" pitchFamily="18" charset="0"/>
+                    <a:cs typeface="Times New Roman" panose="02020603050405020304" pitchFamily="18" charset="0"/>
+                  </a:rPr>
+                  <a:t>in </a:t>
+                </a:r>
+                <a:r>
+                  <a:rPr lang="fr-FR" sz="1800" i="1" kern="100" dirty="0" err="1">
+                    <a:effectLst/>
+                    <a:latin typeface="Cambria" panose="02040503050406030204" pitchFamily="18" charset="0"/>
+                    <a:ea typeface="Cambria" panose="02040503050406030204" pitchFamily="18" charset="0"/>
+                    <a:cs typeface="Times New Roman" panose="02020603050405020304" pitchFamily="18" charset="0"/>
+                  </a:rPr>
+                  <a:t>en</a:t>
+                </a:r>
+                <a:r>
+                  <a:rPr lang="fr-FR" i="1" kern="100" dirty="0" err="1">
+                    <a:latin typeface="Cambria" panose="02040503050406030204" pitchFamily="18" charset="0"/>
+                    <a:ea typeface="Cambria" panose="02040503050406030204" pitchFamily="18" charset="0"/>
+                    <a:cs typeface="Times New Roman" panose="02020603050405020304" pitchFamily="18" charset="0"/>
+                  </a:rPr>
+                  <a:t>ergy</a:t>
+                </a:r>
+                <a:r>
+                  <a:rPr lang="fr-FR" i="1" kern="100" dirty="0">
+                    <a:latin typeface="Cambria" panose="02040503050406030204" pitchFamily="18" charset="0"/>
+                    <a:ea typeface="Cambria" panose="02040503050406030204" pitchFamily="18" charset="0"/>
+                    <a:cs typeface="Times New Roman" panose="02020603050405020304" pitchFamily="18" charset="0"/>
+                  </a:rPr>
+                  <a:t> group </a:t>
+                </a:r>
+                <a:r>
+                  <a:rPr lang="fr-FR" sz="1800" i="1" kern="100" dirty="0">
+                    <a:effectLst/>
+                    <a:latin typeface="Cambria" panose="02040503050406030204" pitchFamily="18" charset="0"/>
+                    <a:ea typeface="Cambria" panose="02040503050406030204" pitchFamily="18" charset="0"/>
+                    <a:cs typeface="Times New Roman" panose="02020603050405020304" pitchFamily="18" charset="0"/>
+                  </a:rPr>
+                  <a:t>g</a:t>
                 </a:r>
                 <a:r>
                   <a:rPr lang="fr-FR" i="1" kern="100" dirty="0">
@@ -5880,12 +6057,148 @@
                   </a:spcAft>
                 </a:pPr>
                 <a:r>
+                  <a:rPr lang="fr-FR" i="1" kern="100" dirty="0" err="1">
+                    <a:latin typeface="Cambria" panose="02040503050406030204" pitchFamily="18" charset="0"/>
+                    <a:ea typeface="Cambria" panose="02040503050406030204" pitchFamily="18" charset="0"/>
+                    <a:cs typeface="Times New Roman" panose="02020603050405020304" pitchFamily="18" charset="0"/>
+                  </a:rPr>
+                  <a:t>With</a:t>
+                </a:r>
+                <a:r>
                   <a:rPr lang="fr-FR" i="1" kern="100" dirty="0">
                     <a:latin typeface="Cambria" panose="02040503050406030204" pitchFamily="18" charset="0"/>
                     <a:ea typeface="Cambria" panose="02040503050406030204" pitchFamily="18" charset="0"/>
                     <a:cs typeface="Times New Roman" panose="02020603050405020304" pitchFamily="18" charset="0"/>
                   </a:rPr>
-                  <a:t>Avec i allant de l’isotope 0 à I, r allant de la réaction 0 à R, et g allant du groupe d’énergie 0 à G.</a:t>
+                  <a:t> i </a:t>
+                </a:r>
+                <a:r>
+                  <a:rPr lang="fr-FR" i="1" kern="100" dirty="0" err="1">
+                    <a:latin typeface="Cambria" panose="02040503050406030204" pitchFamily="18" charset="0"/>
+                    <a:ea typeface="Cambria" panose="02040503050406030204" pitchFamily="18" charset="0"/>
+                    <a:cs typeface="Times New Roman" panose="02020603050405020304" pitchFamily="18" charset="0"/>
+                  </a:rPr>
+                  <a:t>going</a:t>
+                </a:r>
+                <a:r>
+                  <a:rPr lang="fr-FR" i="1" kern="100" dirty="0">
+                    <a:latin typeface="Cambria" panose="02040503050406030204" pitchFamily="18" charset="0"/>
+                    <a:ea typeface="Cambria" panose="02040503050406030204" pitchFamily="18" charset="0"/>
+                    <a:cs typeface="Times New Roman" panose="02020603050405020304" pitchFamily="18" charset="0"/>
+                  </a:rPr>
+                  <a:t> </a:t>
+                </a:r>
+                <a:r>
+                  <a:rPr lang="fr-FR" i="1" kern="100" dirty="0" err="1">
+                    <a:latin typeface="Cambria" panose="02040503050406030204" pitchFamily="18" charset="0"/>
+                    <a:ea typeface="Cambria" panose="02040503050406030204" pitchFamily="18" charset="0"/>
+                    <a:cs typeface="Times New Roman" panose="02020603050405020304" pitchFamily="18" charset="0"/>
+                  </a:rPr>
+                  <a:t>from</a:t>
+                </a:r>
+                <a:r>
+                  <a:rPr lang="fr-FR" i="1" kern="100" dirty="0">
+                    <a:latin typeface="Cambria" panose="02040503050406030204" pitchFamily="18" charset="0"/>
+                    <a:ea typeface="Cambria" panose="02040503050406030204" pitchFamily="18" charset="0"/>
+                    <a:cs typeface="Times New Roman" panose="02020603050405020304" pitchFamily="18" charset="0"/>
+                  </a:rPr>
+                  <a:t> isotope 0 to I, r </a:t>
+                </a:r>
+                <a:r>
+                  <a:rPr lang="fr-FR" i="1" kern="100" dirty="0" err="1">
+                    <a:latin typeface="Cambria" panose="02040503050406030204" pitchFamily="18" charset="0"/>
+                    <a:ea typeface="Cambria" panose="02040503050406030204" pitchFamily="18" charset="0"/>
+                    <a:cs typeface="Times New Roman" panose="02020603050405020304" pitchFamily="18" charset="0"/>
+                  </a:rPr>
+                  <a:t>going</a:t>
+                </a:r>
+                <a:r>
+                  <a:rPr lang="fr-FR" i="1" kern="100" dirty="0">
+                    <a:latin typeface="Cambria" panose="02040503050406030204" pitchFamily="18" charset="0"/>
+                    <a:ea typeface="Cambria" panose="02040503050406030204" pitchFamily="18" charset="0"/>
+                    <a:cs typeface="Times New Roman" panose="02020603050405020304" pitchFamily="18" charset="0"/>
+                  </a:rPr>
+                  <a:t> </a:t>
+                </a:r>
+                <a:r>
+                  <a:rPr lang="fr-FR" i="1" kern="100" dirty="0" err="1">
+                    <a:latin typeface="Cambria" panose="02040503050406030204" pitchFamily="18" charset="0"/>
+                    <a:ea typeface="Cambria" panose="02040503050406030204" pitchFamily="18" charset="0"/>
+                    <a:cs typeface="Times New Roman" panose="02020603050405020304" pitchFamily="18" charset="0"/>
+                  </a:rPr>
+                  <a:t>from</a:t>
+                </a:r>
+                <a:r>
+                  <a:rPr lang="fr-FR" i="1" kern="100" dirty="0">
+                    <a:latin typeface="Cambria" panose="02040503050406030204" pitchFamily="18" charset="0"/>
+                    <a:ea typeface="Cambria" panose="02040503050406030204" pitchFamily="18" charset="0"/>
+                    <a:cs typeface="Times New Roman" panose="02020603050405020304" pitchFamily="18" charset="0"/>
+                  </a:rPr>
+                  <a:t> </a:t>
+                </a:r>
+                <a:r>
+                  <a:rPr lang="fr-FR" i="1" kern="100" dirty="0" err="1">
+                    <a:latin typeface="Cambria" panose="02040503050406030204" pitchFamily="18" charset="0"/>
+                    <a:ea typeface="Cambria" panose="02040503050406030204" pitchFamily="18" charset="0"/>
+                    <a:cs typeface="Times New Roman" panose="02020603050405020304" pitchFamily="18" charset="0"/>
+                  </a:rPr>
+                  <a:t>reaction</a:t>
+                </a:r>
+                <a:r>
+                  <a:rPr lang="fr-FR" i="1" kern="100" dirty="0">
+                    <a:latin typeface="Cambria" panose="02040503050406030204" pitchFamily="18" charset="0"/>
+                    <a:ea typeface="Cambria" panose="02040503050406030204" pitchFamily="18" charset="0"/>
+                    <a:cs typeface="Times New Roman" panose="02020603050405020304" pitchFamily="18" charset="0"/>
+                  </a:rPr>
+                  <a:t> 0 to R, and g </a:t>
+                </a:r>
+                <a:r>
+                  <a:rPr lang="fr-FR" i="1" kern="100" dirty="0" err="1">
+                    <a:latin typeface="Cambria" panose="02040503050406030204" pitchFamily="18" charset="0"/>
+                    <a:ea typeface="Cambria" panose="02040503050406030204" pitchFamily="18" charset="0"/>
+                    <a:cs typeface="Times New Roman" panose="02020603050405020304" pitchFamily="18" charset="0"/>
+                  </a:rPr>
+                  <a:t>going</a:t>
+                </a:r>
+                <a:r>
+                  <a:rPr lang="fr-FR" i="1" kern="100" dirty="0">
+                    <a:latin typeface="Cambria" panose="02040503050406030204" pitchFamily="18" charset="0"/>
+                    <a:ea typeface="Cambria" panose="02040503050406030204" pitchFamily="18" charset="0"/>
+                    <a:cs typeface="Times New Roman" panose="02020603050405020304" pitchFamily="18" charset="0"/>
+                  </a:rPr>
+                  <a:t> </a:t>
+                </a:r>
+                <a:r>
+                  <a:rPr lang="fr-FR" i="1" kern="100" dirty="0" err="1">
+                    <a:latin typeface="Cambria" panose="02040503050406030204" pitchFamily="18" charset="0"/>
+                    <a:ea typeface="Cambria" panose="02040503050406030204" pitchFamily="18" charset="0"/>
+                    <a:cs typeface="Times New Roman" panose="02020603050405020304" pitchFamily="18" charset="0"/>
+                  </a:rPr>
+                  <a:t>from</a:t>
+                </a:r>
+                <a:r>
+                  <a:rPr lang="fr-FR" i="1" kern="100" dirty="0">
+                    <a:latin typeface="Cambria" panose="02040503050406030204" pitchFamily="18" charset="0"/>
+                    <a:ea typeface="Cambria" panose="02040503050406030204" pitchFamily="18" charset="0"/>
+                    <a:cs typeface="Times New Roman" panose="02020603050405020304" pitchFamily="18" charset="0"/>
+                  </a:rPr>
+                  <a:t> </a:t>
+                </a:r>
+                <a:r>
+                  <a:rPr lang="fr-FR" i="1" kern="100" dirty="0" err="1">
+                    <a:latin typeface="Cambria" panose="02040503050406030204" pitchFamily="18" charset="0"/>
+                    <a:ea typeface="Cambria" panose="02040503050406030204" pitchFamily="18" charset="0"/>
+                    <a:cs typeface="Times New Roman" panose="02020603050405020304" pitchFamily="18" charset="0"/>
+                  </a:rPr>
+                  <a:t>energy</a:t>
+                </a:r>
+                <a:r>
+                  <a:rPr lang="fr-FR" i="1" kern="100" dirty="0">
+                    <a:latin typeface="Cambria" panose="02040503050406030204" pitchFamily="18" charset="0"/>
+                    <a:ea typeface="Cambria" panose="02040503050406030204" pitchFamily="18" charset="0"/>
+                    <a:cs typeface="Times New Roman" panose="02020603050405020304" pitchFamily="18" charset="0"/>
+                  </a:rPr>
+                  <a:t> group 0 to G.</a:t>
                 </a:r>
                 <a:endParaRPr lang="fr-FR" kern="100" dirty="0">
                   <a:effectLst/>
@@ -5915,7 +6228,7 @@
             <p:spPr>
               <a:xfrm>
                 <a:off x="2751288" y="3789170"/>
-                <a:ext cx="6096000" cy="2140073"/>
+                <a:ext cx="6230342" cy="1842107"/>
               </a:xfrm>
               <a:prstGeom prst="rect">
                 <a:avLst/>
@@ -5923,7 +6236,7 @@
               <a:blipFill>
                 <a:blip r:embed="rId5"/>
                 <a:stretch>
-                  <a:fillRect b="-3116"/>
+                  <a:fillRect r="-195" b="-3947"/>
                 </a:stretch>
               </a:blipFill>
               <a:ln w="12700">
@@ -5937,7 +6250,7 @@
               <a:lstStyle/>
               <a:p>
                 <a:r>
-                  <a:rPr lang="fr-FR">
+                  <a:rPr lang="en-US">
                     <a:noFill/>
                   </a:rPr>
                   <a:t> </a:t>
@@ -6096,7 +6409,47 @@
                     <a:cs typeface="Times New Roman" panose="02020603050405020304" pitchFamily="18" charset="0"/>
                     <a:sym typeface="Wingdings" panose="05000000000000000000" pitchFamily="2" charset="2"/>
                   </a:rPr>
-                  <a:t> : Nombre total de pairs isotope-réaction	</a:t>
+                  <a:t> : Total </a:t>
+                </a:r>
+                <a:r>
+                  <a:rPr lang="fr-FR" sz="1400" kern="100" dirty="0" err="1">
+                    <a:effectLst/>
+                    <a:latin typeface="Cambria" panose="02040503050406030204" pitchFamily="18" charset="0"/>
+                    <a:ea typeface="Cambria" panose="02040503050406030204" pitchFamily="18" charset="0"/>
+                    <a:cs typeface="Times New Roman" panose="02020603050405020304" pitchFamily="18" charset="0"/>
+                    <a:sym typeface="Wingdings" panose="05000000000000000000" pitchFamily="2" charset="2"/>
+                  </a:rPr>
+                  <a:t>number</a:t>
+                </a:r>
+                <a:r>
+                  <a:rPr lang="fr-FR" sz="1400" kern="100" dirty="0">
+                    <a:effectLst/>
+                    <a:latin typeface="Cambria" panose="02040503050406030204" pitchFamily="18" charset="0"/>
+                    <a:ea typeface="Cambria" panose="02040503050406030204" pitchFamily="18" charset="0"/>
+                    <a:cs typeface="Times New Roman" panose="02020603050405020304" pitchFamily="18" charset="0"/>
+                    <a:sym typeface="Wingdings" panose="05000000000000000000" pitchFamily="2" charset="2"/>
+                  </a:rPr>
+                  <a:t> of isotope-</a:t>
+                </a:r>
+                <a:r>
+                  <a:rPr lang="fr-FR" sz="1400" kern="100" dirty="0" err="1">
+                    <a:effectLst/>
+                    <a:latin typeface="Cambria" panose="02040503050406030204" pitchFamily="18" charset="0"/>
+                    <a:ea typeface="Cambria" panose="02040503050406030204" pitchFamily="18" charset="0"/>
+                    <a:cs typeface="Times New Roman" panose="02020603050405020304" pitchFamily="18" charset="0"/>
+                    <a:sym typeface="Wingdings" panose="05000000000000000000" pitchFamily="2" charset="2"/>
+                  </a:rPr>
+                  <a:t>reaction</a:t>
+                </a:r>
+                <a:r>
+                  <a:rPr lang="fr-FR" sz="1400" kern="100" dirty="0">
+                    <a:effectLst/>
+                    <a:latin typeface="Cambria" panose="02040503050406030204" pitchFamily="18" charset="0"/>
+                    <a:ea typeface="Cambria" panose="02040503050406030204" pitchFamily="18" charset="0"/>
+                    <a:cs typeface="Times New Roman" panose="02020603050405020304" pitchFamily="18" charset="0"/>
+                    <a:sym typeface="Wingdings" panose="05000000000000000000" pitchFamily="2" charset="2"/>
+                  </a:rPr>
+                  <a:t> pairs	</a:t>
                 </a:r>
                 <a:endParaRPr lang="fr-FR" sz="1400" kern="100" dirty="0">
                   <a:effectLst/>
@@ -6146,7 +6499,7 @@
               <a:lstStyle/>
               <a:p>
                 <a:r>
-                  <a:rPr lang="fr-FR">
+                  <a:rPr lang="en-US">
                     <a:noFill/>
                   </a:rPr>
                   <a:t> </a:t>
@@ -9735,7 +10088,7 @@
             <p:spPr>
               <a:xfrm>
                 <a:off x="1988993" y="3262251"/>
-                <a:ext cx="8214014" cy="2615781"/>
+                <a:ext cx="8214014" cy="2349554"/>
               </a:xfrm>
               <a:prstGeom prst="rect">
                 <a:avLst/>
@@ -9798,7 +10151,15 @@
                     <a:ea typeface="Cambria" panose="02040503050406030204" pitchFamily="18" charset="0"/>
                     <a:cs typeface="Times New Roman" panose="02020603050405020304" pitchFamily="18" charset="0"/>
                   </a:rPr>
-                  <a:t> : indice horizontal parcourant chaque groupe d’énergies, pour tou</a:t>
+                  <a:t> : </a:t>
+                </a:r>
+                <a:r>
+                  <a:rPr lang="en-US" sz="1600" i="1" kern="100" dirty="0">
+                    <a:latin typeface="Cambria" panose="02040503050406030204" pitchFamily="18" charset="0"/>
+                    <a:ea typeface="Cambria" panose="02040503050406030204" pitchFamily="18" charset="0"/>
+                    <a:cs typeface="Times New Roman" panose="02020603050405020304" pitchFamily="18" charset="0"/>
+                  </a:rPr>
+                  <a:t>horizontal index running over each energy group, for all isotope–reaction pairs</a:t>
                 </a:r>
                 <a:r>
                   <a:rPr lang="fr-FR" sz="1600" i="1" kern="100" dirty="0">
@@ -9806,7 +10167,7 @@
                     <a:ea typeface="Cambria" panose="02040503050406030204" pitchFamily="18" charset="0"/>
                     <a:cs typeface="Times New Roman" panose="02020603050405020304" pitchFamily="18" charset="0"/>
                   </a:rPr>
-                  <a:t>s les couples isotope-réaction (i,r) ; soit </a:t>
+                  <a:t> (i,r) ; i.e. </a:t>
                 </a:r>
                 <a14:m>
                   <m:oMath xmlns:m="http://schemas.openxmlformats.org/officeDocument/2006/math">
@@ -9970,7 +10331,15 @@
                     <a:ea typeface="Cambria" panose="02040503050406030204" pitchFamily="18" charset="0"/>
                     <a:cs typeface="Times New Roman" panose="02020603050405020304" pitchFamily="18" charset="0"/>
                   </a:rPr>
-                  <a:t>: indice vertical parcourant chaque groupe d’énergies, pour tou</a:t>
+                  <a:t>: </a:t>
+                </a:r>
+                <a:r>
+                  <a:rPr lang="en-US" sz="1600" i="1" kern="100" dirty="0">
+                    <a:latin typeface="Cambria" panose="02040503050406030204" pitchFamily="18" charset="0"/>
+                    <a:ea typeface="Cambria" panose="02040503050406030204" pitchFamily="18" charset="0"/>
+                    <a:cs typeface="Times New Roman" panose="02020603050405020304" pitchFamily="18" charset="0"/>
+                  </a:rPr>
+                  <a:t>vertical index running over each energy group, for all isotope–reaction pairs </a:t>
                 </a:r>
                 <a:r>
                   <a:rPr lang="fr-FR" sz="1600" i="1" kern="100" dirty="0">
@@ -9978,7 +10347,7 @@
                     <a:ea typeface="Cambria" panose="02040503050406030204" pitchFamily="18" charset="0"/>
                     <a:cs typeface="Times New Roman" panose="02020603050405020304" pitchFamily="18" charset="0"/>
                   </a:rPr>
-                  <a:t>s les couples isotope-réaction (i,r) ; soit </a:t>
+                  <a:t>(i,r) ; i.e. </a:t>
                 </a:r>
                 <a14:m>
                   <m:oMath xmlns:m="http://schemas.openxmlformats.org/officeDocument/2006/math">
@@ -10407,27 +10776,27 @@
                     <a:ea typeface="Cambria" panose="02040503050406030204" pitchFamily="18" charset="0"/>
                     <a:cs typeface="Times New Roman" panose="02020603050405020304" pitchFamily="18" charset="0"/>
                   </a:rPr>
-                  <a:t> : facteur de corrélation entre les incertitudes sur les sections efficaces microscopiques </a:t>
+                  <a:t> : </a:t>
                 </a:r>
                 <a:r>
-                  <a:rPr lang="fr-FR" sz="1600" i="1" kern="100" dirty="0">
+                  <a:rPr lang="en-US" sz="1600" i="1" kern="100" dirty="0">
                     <a:latin typeface="Cambria" panose="02040503050406030204" pitchFamily="18" charset="0"/>
                     <a:ea typeface="Cambria" panose="02040503050406030204" pitchFamily="18" charset="0"/>
                     <a:cs typeface="Times New Roman" panose="02020603050405020304" pitchFamily="18" charset="0"/>
                   </a:rPr>
-                  <a:t>de la</a:t>
+                  <a:t>correlation factor between the uncertainties of the microscopic cross section of reaction </a:t>
                 </a:r>
                 <a:r>
-                  <a:rPr lang="fr-FR" sz="1600" i="1" kern="100" dirty="0">
+                  <a:rPr lang="fr-FR" sz="1600" i="1" kern="100" dirty="0" err="1">
                     <a:effectLst/>
                     <a:latin typeface="Cambria" panose="02040503050406030204" pitchFamily="18" charset="0"/>
                     <a:ea typeface="Cambria" panose="02040503050406030204" pitchFamily="18" charset="0"/>
                     <a:cs typeface="Times New Roman" panose="02020603050405020304" pitchFamily="18" charset="0"/>
                   </a:rPr>
-                  <a:t> réaction r</a:t>
+                  <a:t>r</a:t>
                 </a:r>
                 <a:r>
-                  <a:rPr lang="fr-FR" sz="1600" i="1" kern="100" baseline="-25000" dirty="0">
+                  <a:rPr lang="fr-FR" sz="1600" i="1" kern="100" baseline="-25000" dirty="0" err="1">
                     <a:latin typeface="Cambria" panose="02040503050406030204" pitchFamily="18" charset="0"/>
                     <a:ea typeface="Cambria" panose="02040503050406030204" pitchFamily="18" charset="0"/>
                     <a:cs typeface="Times New Roman" panose="02020603050405020304" pitchFamily="18" charset="0"/>
@@ -10441,10 +10810,19 @@
                     <a:ea typeface="Cambria" panose="02040503050406030204" pitchFamily="18" charset="0"/>
                     <a:cs typeface="Times New Roman" panose="02020603050405020304" pitchFamily="18" charset="0"/>
                   </a:rPr>
-                  <a:t> de l’ isotope i</a:t>
+                  <a:t> for isotope </a:t>
                 </a:r>
                 <a:r>
-                  <a:rPr lang="fr-FR" sz="1600" i="1" kern="100" baseline="-25000" dirty="0">
+                  <a:rPr lang="fr-FR" sz="1600" i="1" kern="100" dirty="0" err="1">
+                    <a:effectLst/>
+                    <a:latin typeface="Cambria" panose="02040503050406030204" pitchFamily="18" charset="0"/>
+                    <a:ea typeface="Cambria" panose="02040503050406030204" pitchFamily="18" charset="0"/>
+                    <a:cs typeface="Times New Roman" panose="02020603050405020304" pitchFamily="18" charset="0"/>
+                  </a:rPr>
+                  <a:t>i</a:t>
+                </a:r>
+                <a:r>
+                  <a:rPr lang="fr-FR" sz="1600" i="1" kern="100" baseline="-25000" dirty="0" err="1">
                     <a:effectLst/>
                     <a:latin typeface="Cambria" panose="02040503050406030204" pitchFamily="18" charset="0"/>
                     <a:ea typeface="Cambria" panose="02040503050406030204" pitchFamily="18" charset="0"/>
@@ -10459,10 +10837,37 @@
                     <a:ea typeface="Cambria" panose="02040503050406030204" pitchFamily="18" charset="0"/>
                     <a:cs typeface="Times New Roman" panose="02020603050405020304" pitchFamily="18" charset="0"/>
                   </a:rPr>
-                  <a:t> dans un groupe d’énergies g</a:t>
+                  <a:t> in </a:t>
                 </a:r>
                 <a:r>
-                  <a:rPr lang="fr-FR" sz="1600" i="1" kern="100" baseline="-25000" dirty="0">
+                  <a:rPr lang="fr-FR" sz="1600" i="1" kern="100" dirty="0" err="1">
+                    <a:effectLst/>
+                    <a:latin typeface="Cambria" panose="02040503050406030204" pitchFamily="18" charset="0"/>
+                    <a:ea typeface="Cambria" panose="02040503050406030204" pitchFamily="18" charset="0"/>
+                    <a:cs typeface="Times New Roman" panose="02020603050405020304" pitchFamily="18" charset="0"/>
+                  </a:rPr>
+                  <a:t>energy</a:t>
+                </a:r>
+                <a:r>
+                  <a:rPr lang="fr-FR" sz="1600" i="1" kern="100" dirty="0">
+                    <a:effectLst/>
+                    <a:latin typeface="Cambria" panose="02040503050406030204" pitchFamily="18" charset="0"/>
+                    <a:ea typeface="Cambria" panose="02040503050406030204" pitchFamily="18" charset="0"/>
+                    <a:cs typeface="Times New Roman" panose="02020603050405020304" pitchFamily="18" charset="0"/>
+                  </a:rPr>
+                  <a:t> group </a:t>
+                </a:r>
+                <a:r>
+                  <a:rPr lang="fr-FR" sz="1600" i="1" kern="100" dirty="0" err="1">
+                    <a:effectLst/>
+                    <a:latin typeface="Cambria" panose="02040503050406030204" pitchFamily="18" charset="0"/>
+                    <a:ea typeface="Cambria" panose="02040503050406030204" pitchFamily="18" charset="0"/>
+                    <a:cs typeface="Times New Roman" panose="02020603050405020304" pitchFamily="18" charset="0"/>
+                  </a:rPr>
+                  <a:t>g</a:t>
+                </a:r>
+                <a:r>
+                  <a:rPr lang="fr-FR" sz="1600" i="1" kern="100" baseline="-25000" dirty="0" err="1">
                     <a:effectLst/>
                     <a:latin typeface="Cambria" panose="02040503050406030204" pitchFamily="18" charset="0"/>
                     <a:ea typeface="Cambria" panose="02040503050406030204" pitchFamily="18" charset="0"/>
@@ -10476,7 +10881,31 @@
                     <a:ea typeface="Cambria" panose="02040503050406030204" pitchFamily="18" charset="0"/>
                     <a:cs typeface="Times New Roman" panose="02020603050405020304" pitchFamily="18" charset="0"/>
                   </a:rPr>
-                  <a:t>, et de la réaction r</a:t>
+                  <a:t>, and réaction </a:t>
+                </a:r>
+                <a:r>
+                  <a:rPr lang="fr-FR" sz="1600" i="1" kern="100" dirty="0" err="1">
+                    <a:latin typeface="Cambria" panose="02040503050406030204" pitchFamily="18" charset="0"/>
+                    <a:ea typeface="Cambria" panose="02040503050406030204" pitchFamily="18" charset="0"/>
+                    <a:cs typeface="Times New Roman" panose="02020603050405020304" pitchFamily="18" charset="0"/>
+                  </a:rPr>
+                  <a:t>r</a:t>
+                </a:r>
+                <a:r>
+                  <a:rPr lang="fr-FR" sz="1600" i="1" kern="100" baseline="-25000" dirty="0" err="1">
+                    <a:latin typeface="Cambria" panose="02040503050406030204" pitchFamily="18" charset="0"/>
+                    <a:ea typeface="Cambria" panose="02040503050406030204" pitchFamily="18" charset="0"/>
+                    <a:cs typeface="Times New Roman" panose="02020603050405020304" pitchFamily="18" charset="0"/>
+                  </a:rPr>
+                  <a:t>v</a:t>
+                </a:r>
+                <a:r>
+                  <a:rPr lang="fr-FR" sz="1600" i="1" kern="100" dirty="0">
+                    <a:latin typeface="Cambria" panose="02040503050406030204" pitchFamily="18" charset="0"/>
+                    <a:ea typeface="Cambria" panose="02040503050406030204" pitchFamily="18" charset="0"/>
+                    <a:cs typeface="Times New Roman" panose="02020603050405020304" pitchFamily="18" charset="0"/>
+                  </a:rPr>
+                  <a:t> for isotope i</a:t>
                 </a:r>
                 <a:r>
                   <a:rPr lang="fr-FR" sz="1600" i="1" kern="100" baseline="-25000" dirty="0">
@@ -10492,15 +10921,15 @@
                     <a:ea typeface="Cambria" panose="02040503050406030204" pitchFamily="18" charset="0"/>
                     <a:cs typeface="Times New Roman" panose="02020603050405020304" pitchFamily="18" charset="0"/>
                   </a:rPr>
-                  <a:t> de l’isotope i</a:t>
+                  <a:t>, in </a:t>
                 </a:r>
                 <a:r>
-                  <a:rPr lang="fr-FR" sz="1600" i="1" kern="100" baseline="-25000" dirty="0">
+                  <a:rPr lang="fr-FR" sz="1600" i="1" kern="100" dirty="0" err="1">
                     <a:latin typeface="Cambria" panose="02040503050406030204" pitchFamily="18" charset="0"/>
                     <a:ea typeface="Cambria" panose="02040503050406030204" pitchFamily="18" charset="0"/>
                     <a:cs typeface="Times New Roman" panose="02020603050405020304" pitchFamily="18" charset="0"/>
                   </a:rPr>
-                  <a:t>v</a:t>
+                  <a:t>energy</a:t>
                 </a:r>
                 <a:r>
                   <a:rPr lang="fr-FR" sz="1600" i="1" kern="100" dirty="0">
@@ -10508,7 +10937,7 @@
                     <a:ea typeface="Cambria" panose="02040503050406030204" pitchFamily="18" charset="0"/>
                     <a:cs typeface="Times New Roman" panose="02020603050405020304" pitchFamily="18" charset="0"/>
                   </a:rPr>
-                  <a:t>, dans un groupe d’énergies </a:t>
+                  <a:t> group </a:t>
                 </a:r>
                 <a:r>
                   <a:rPr lang="fr-FR" sz="1600" i="1" kern="100" dirty="0" err="1">
@@ -10532,7 +10961,7 @@
                     <a:ea typeface="Cambria" panose="02040503050406030204" pitchFamily="18" charset="0"/>
                     <a:cs typeface="Times New Roman" panose="02020603050405020304" pitchFamily="18" charset="0"/>
                   </a:rPr>
-                  <a:t> . A noter : </a:t>
+                  <a:t> . Note: </a:t>
                 </a:r>
                 <a14:m>
                   <m:oMath xmlns:m="http://schemas.openxmlformats.org/officeDocument/2006/math">
@@ -10582,7 +11011,24 @@
                     <a:ea typeface="Cambria" panose="02040503050406030204" pitchFamily="18" charset="0"/>
                     <a:cs typeface="Times New Roman" panose="02020603050405020304" pitchFamily="18" charset="0"/>
                   </a:rPr>
-                  <a:t> = 1 ; quand h=v.</a:t>
+                  <a:t> = 1 ; </a:t>
+                </a:r>
+                <a:r>
+                  <a:rPr lang="fr-FR" sz="1600" i="1" kern="100" dirty="0" err="1">
+                    <a:latin typeface="Cambria" panose="02040503050406030204" pitchFamily="18" charset="0"/>
+                    <a:ea typeface="Cambria" panose="02040503050406030204" pitchFamily="18" charset="0"/>
+                    <a:cs typeface="Times New Roman" panose="02020603050405020304" pitchFamily="18" charset="0"/>
+                  </a:rPr>
+                  <a:t>when</a:t>
+                </a:r>
+                <a:r>
+                  <a:rPr lang="fr-FR" sz="1600" i="1" kern="100" dirty="0">
+                    <a:effectLst/>
+                    <a:latin typeface="Cambria" panose="02040503050406030204" pitchFamily="18" charset="0"/>
+                    <a:ea typeface="Cambria" panose="02040503050406030204" pitchFamily="18" charset="0"/>
+                    <a:cs typeface="Times New Roman" panose="02020603050405020304" pitchFamily="18" charset="0"/>
+                  </a:rPr>
+                  <a:t> h=v.</a:t>
                 </a:r>
               </a:p>
             </p:txBody>
@@ -10606,7 +11052,7 @@
             <p:spPr>
               <a:xfrm>
                 <a:off x="1988993" y="3262251"/>
-                <a:ext cx="8214014" cy="2615781"/>
+                <a:ext cx="8214014" cy="2349554"/>
               </a:xfrm>
               <a:prstGeom prst="rect">
                 <a:avLst/>
@@ -10614,7 +11060,7 @@
               <a:blipFill>
                 <a:blip r:embed="rId3"/>
                 <a:stretch>
-                  <a:fillRect t="-696" b="-1624"/>
+                  <a:fillRect t="-773" b="-1804"/>
                 </a:stretch>
               </a:blipFill>
               <a:ln w="12700">
@@ -10628,7 +11074,7 @@
               <a:lstStyle/>
               <a:p>
                 <a:r>
-                  <a:rPr lang="fr-FR">
+                  <a:rPr lang="en-US">
                     <a:noFill/>
                   </a:rPr>
                   <a:t> </a:t>
@@ -10653,7 +11099,7 @@
         <p:spPr>
           <a:xfrm>
             <a:off x="4496653" y="348315"/>
-            <a:ext cx="3376822" cy="523220"/>
+            <a:ext cx="2884700" cy="523220"/>
           </a:xfrm>
           <a:prstGeom prst="rect">
             <a:avLst/>
@@ -10680,7 +11126,23 @@
                 <a:ea typeface="Cambria" panose="02040503050406030204" pitchFamily="18" charset="0"/>
                 <a:cs typeface="Times New Roman" panose="02020603050405020304" pitchFamily="18" charset="0"/>
               </a:rPr>
-              <a:t> : matrice de corrélations</a:t>
+              <a:t> : </a:t>
+            </a:r>
+            <a:r>
+              <a:rPr lang="fr-FR" dirty="0" err="1">
+                <a:latin typeface="Cambria" panose="02040503050406030204" pitchFamily="18" charset="0"/>
+                <a:ea typeface="Cambria" panose="02040503050406030204" pitchFamily="18" charset="0"/>
+                <a:cs typeface="Times New Roman" panose="02020603050405020304" pitchFamily="18" charset="0"/>
+              </a:rPr>
+              <a:t>correlation</a:t>
+            </a:r>
+            <a:r>
+              <a:rPr lang="fr-FR" dirty="0">
+                <a:latin typeface="Cambria" panose="02040503050406030204" pitchFamily="18" charset="0"/>
+                <a:ea typeface="Cambria" panose="02040503050406030204" pitchFamily="18" charset="0"/>
+                <a:cs typeface="Times New Roman" panose="02020603050405020304" pitchFamily="18" charset="0"/>
+              </a:rPr>
+              <a:t> matrix</a:t>
             </a:r>
           </a:p>
         </p:txBody>
@@ -14419,8 +14881,8 @@
             </p:nvSpPr>
             <p:spPr>
               <a:xfrm>
-                <a:off x="921509" y="3618010"/>
-                <a:ext cx="10650855" cy="2994602"/>
+                <a:off x="921509" y="3549642"/>
+                <a:ext cx="10650855" cy="3205749"/>
               </a:xfrm>
               <a:prstGeom prst="rect">
                 <a:avLst/>
@@ -14483,7 +14945,15 @@
                     <a:ea typeface="Cambria" panose="02040503050406030204" pitchFamily="18" charset="0"/>
                     <a:cs typeface="Times New Roman" panose="02020603050405020304" pitchFamily="18" charset="0"/>
                   </a:rPr>
-                  <a:t>: indice horizontal parcourant chaque groupe d’énergies, pour tou</a:t>
+                  <a:t>: </a:t>
+                </a:r>
+                <a:r>
+                  <a:rPr lang="en-US" sz="1600" i="1" kern="100" dirty="0">
+                    <a:latin typeface="Cambria" panose="02040503050406030204" pitchFamily="18" charset="0"/>
+                    <a:ea typeface="Cambria" panose="02040503050406030204" pitchFamily="18" charset="0"/>
+                    <a:cs typeface="Times New Roman" panose="02020603050405020304" pitchFamily="18" charset="0"/>
+                  </a:rPr>
+                  <a:t>horizontal index running over each energy group, for all isotope–reaction pairs</a:t>
                 </a:r>
                 <a:r>
                   <a:rPr lang="fr-FR" sz="1600" i="1" kern="100" dirty="0">
@@ -14491,7 +14961,7 @@
                     <a:ea typeface="Cambria" panose="02040503050406030204" pitchFamily="18" charset="0"/>
                     <a:cs typeface="Times New Roman" panose="02020603050405020304" pitchFamily="18" charset="0"/>
                   </a:rPr>
-                  <a:t>s les couples isotope-réaction (</a:t>
+                  <a:t> (</a:t>
                 </a:r>
                 <a:r>
                   <a:rPr lang="fr-FR" sz="1600" i="1" kern="100" dirty="0" err="1">
@@ -14565,7 +15035,15 @@
                     <a:ea typeface="Cambria" panose="02040503050406030204" pitchFamily="18" charset="0"/>
                     <a:cs typeface="Times New Roman" panose="02020603050405020304" pitchFamily="18" charset="0"/>
                   </a:rPr>
-                  <a:t>: indice vertical parcourant chaque groupe d’énergies, pour tou</a:t>
+                  <a:t>: </a:t>
+                </a:r>
+                <a:r>
+                  <a:rPr lang="en-US" sz="1600" i="1" kern="100" dirty="0">
+                    <a:latin typeface="Cambria" panose="02040503050406030204" pitchFamily="18" charset="0"/>
+                    <a:ea typeface="Cambria" panose="02040503050406030204" pitchFamily="18" charset="0"/>
+                    <a:cs typeface="Times New Roman" panose="02020603050405020304" pitchFamily="18" charset="0"/>
+                  </a:rPr>
+                  <a:t>vertical index running over each energy group, for all isotope–reaction pairs </a:t>
                 </a:r>
                 <a:r>
                   <a:rPr lang="fr-FR" sz="1600" i="1" kern="100" dirty="0">
@@ -14573,7 +15051,7 @@
                     <a:ea typeface="Cambria" panose="02040503050406030204" pitchFamily="18" charset="0"/>
                     <a:cs typeface="Times New Roman" panose="02020603050405020304" pitchFamily="18" charset="0"/>
                   </a:rPr>
-                  <a:t>s les couples isotope-réaction (</a:t>
+                  <a:t>(</a:t>
                 </a:r>
                 <a:r>
                   <a:rPr lang="fr-FR" sz="1600" i="1" kern="100" dirty="0" err="1">
@@ -15138,63 +15616,26 @@
                     <a:ea typeface="Cambria" panose="02040503050406030204" pitchFamily="18" charset="0"/>
                     <a:cs typeface="Times New Roman" panose="02020603050405020304" pitchFamily="18" charset="0"/>
                   </a:rPr>
-                  <a:t> : covariance entre </a:t>
+                  <a:t> : covariance </a:t>
                 </a:r>
                 <a:r>
-                  <a:rPr lang="fr-FR" sz="1600" i="1" kern="100" dirty="0">
+                  <a:rPr lang="en-US" sz="1600" i="1" kern="100" dirty="0">
                     <a:latin typeface="Cambria" panose="02040503050406030204" pitchFamily="18" charset="0"/>
                     <a:ea typeface="Cambria" panose="02040503050406030204" pitchFamily="18" charset="0"/>
                     <a:cs typeface="Times New Roman" panose="02020603050405020304" pitchFamily="18" charset="0"/>
                   </a:rPr>
-                  <a:t>la</a:t>
+                  <a:t>between the uncertainties of the microscopic cross section of reaction </a:t>
                 </a:r>
                 <a:r>
-                  <a:rPr lang="fr-FR" sz="1600" i="1" kern="100" dirty="0">
-                    <a:effectLst/>
+                  <a:rPr lang="fr-FR" sz="1600" i="1" kern="100" dirty="0" err="1">
                     <a:latin typeface="Cambria" panose="02040503050406030204" pitchFamily="18" charset="0"/>
                     <a:ea typeface="Cambria" panose="02040503050406030204" pitchFamily="18" charset="0"/>
                     <a:cs typeface="Times New Roman" panose="02020603050405020304" pitchFamily="18" charset="0"/>
                   </a:rPr>
-                  <a:t> réaction r</a:t>
+                  <a:t>r</a:t>
                 </a:r>
                 <a:r>
-                  <a:rPr lang="fr-FR" sz="1600" i="1" kern="100" baseline="-25000" dirty="0">
-                    <a:latin typeface="Cambria" panose="02040503050406030204" pitchFamily="18" charset="0"/>
-                    <a:ea typeface="Cambria" panose="02040503050406030204" pitchFamily="18" charset="0"/>
-                    <a:cs typeface="Times New Roman" panose="02020603050405020304" pitchFamily="18" charset="0"/>
-                  </a:rPr>
-                  <a:t>h</a:t>
-                </a:r>
-                <a:r>
-                  <a:rPr lang="fr-FR" sz="1600" i="1" kern="100" dirty="0">
-                    <a:effectLst/>
-                    <a:latin typeface="Cambria" panose="02040503050406030204" pitchFamily="18" charset="0"/>
-                    <a:ea typeface="Cambria" panose="02040503050406030204" pitchFamily="18" charset="0"/>
-                    <a:cs typeface="Times New Roman" panose="02020603050405020304" pitchFamily="18" charset="0"/>
-                  </a:rPr>
-                  <a:t> de l’ isotope i</a:t>
-                </a:r>
-                <a:r>
-                  <a:rPr lang="fr-FR" sz="1600" i="1" kern="100" baseline="-25000" dirty="0">
-                    <a:effectLst/>
-                    <a:latin typeface="Cambria" panose="02040503050406030204" pitchFamily="18" charset="0"/>
-                    <a:ea typeface="Cambria" panose="02040503050406030204" pitchFamily="18" charset="0"/>
-                    <a:cs typeface="Times New Roman" panose="02020603050405020304" pitchFamily="18" charset="0"/>
-                  </a:rPr>
-                  <a:t>h</a:t>
-                </a:r>
-                <a:r>
-                  <a:rPr lang="fr-FR" sz="1600" i="1" kern="100" dirty="0">
-                    <a:effectLst/>
-                    <a:latin typeface="Cambria" panose="02040503050406030204" pitchFamily="18" charset="0"/>
-                    <a:ea typeface="Cambria" panose="02040503050406030204" pitchFamily="18" charset="0"/>
-                    <a:cs typeface="Times New Roman" panose="02020603050405020304" pitchFamily="18" charset="0"/>
-                  </a:rPr>
-                  <a:t> dans un groupe d’énergies g</a:t>
-                </a:r>
-                <a:r>
-                  <a:rPr lang="fr-FR" sz="1600" i="1" kern="100" baseline="-25000" dirty="0">
-                    <a:effectLst/>
+                  <a:rPr lang="fr-FR" sz="1600" i="1" kern="100" baseline="-25000" dirty="0" err="1">
                     <a:latin typeface="Cambria" panose="02040503050406030204" pitchFamily="18" charset="0"/>
                     <a:ea typeface="Cambria" panose="02040503050406030204" pitchFamily="18" charset="0"/>
                     <a:cs typeface="Times New Roman" panose="02020603050405020304" pitchFamily="18" charset="0"/>
@@ -15207,7 +15648,95 @@
                     <a:ea typeface="Cambria" panose="02040503050406030204" pitchFamily="18" charset="0"/>
                     <a:cs typeface="Times New Roman" panose="02020603050405020304" pitchFamily="18" charset="0"/>
                   </a:rPr>
-                  <a:t>, et la réaction r</a:t>
+                  <a:t> for isotope </a:t>
+                </a:r>
+                <a:r>
+                  <a:rPr lang="fr-FR" sz="1600" i="1" kern="100" dirty="0" err="1">
+                    <a:latin typeface="Cambria" panose="02040503050406030204" pitchFamily="18" charset="0"/>
+                    <a:ea typeface="Cambria" panose="02040503050406030204" pitchFamily="18" charset="0"/>
+                    <a:cs typeface="Times New Roman" panose="02020603050405020304" pitchFamily="18" charset="0"/>
+                  </a:rPr>
+                  <a:t>i</a:t>
+                </a:r>
+                <a:r>
+                  <a:rPr lang="fr-FR" sz="1600" i="1" kern="100" baseline="-25000" dirty="0" err="1">
+                    <a:latin typeface="Cambria" panose="02040503050406030204" pitchFamily="18" charset="0"/>
+                    <a:ea typeface="Cambria" panose="02040503050406030204" pitchFamily="18" charset="0"/>
+                    <a:cs typeface="Times New Roman" panose="02020603050405020304" pitchFamily="18" charset="0"/>
+                  </a:rPr>
+                  <a:t>h</a:t>
+                </a:r>
+                <a:r>
+                  <a:rPr lang="fr-FR" sz="1600" i="1" kern="100" dirty="0">
+                    <a:latin typeface="Cambria" panose="02040503050406030204" pitchFamily="18" charset="0"/>
+                    <a:ea typeface="Cambria" panose="02040503050406030204" pitchFamily="18" charset="0"/>
+                    <a:cs typeface="Times New Roman" panose="02020603050405020304" pitchFamily="18" charset="0"/>
+                  </a:rPr>
+                  <a:t> in </a:t>
+                </a:r>
+                <a:r>
+                  <a:rPr lang="fr-FR" sz="1600" i="1" kern="100" dirty="0" err="1">
+                    <a:latin typeface="Cambria" panose="02040503050406030204" pitchFamily="18" charset="0"/>
+                    <a:ea typeface="Cambria" panose="02040503050406030204" pitchFamily="18" charset="0"/>
+                    <a:cs typeface="Times New Roman" panose="02020603050405020304" pitchFamily="18" charset="0"/>
+                  </a:rPr>
+                  <a:t>energy</a:t>
+                </a:r>
+                <a:r>
+                  <a:rPr lang="fr-FR" sz="1600" i="1" kern="100" dirty="0">
+                    <a:latin typeface="Cambria" panose="02040503050406030204" pitchFamily="18" charset="0"/>
+                    <a:ea typeface="Cambria" panose="02040503050406030204" pitchFamily="18" charset="0"/>
+                    <a:cs typeface="Times New Roman" panose="02020603050405020304" pitchFamily="18" charset="0"/>
+                  </a:rPr>
+                  <a:t> group </a:t>
+                </a:r>
+                <a:r>
+                  <a:rPr lang="fr-FR" sz="1600" i="1" kern="100" dirty="0" err="1">
+                    <a:latin typeface="Cambria" panose="02040503050406030204" pitchFamily="18" charset="0"/>
+                    <a:ea typeface="Cambria" panose="02040503050406030204" pitchFamily="18" charset="0"/>
+                    <a:cs typeface="Times New Roman" panose="02020603050405020304" pitchFamily="18" charset="0"/>
+                  </a:rPr>
+                  <a:t>g</a:t>
+                </a:r>
+                <a:r>
+                  <a:rPr lang="fr-FR" sz="1600" i="1" kern="100" baseline="-25000" dirty="0" err="1">
+                    <a:latin typeface="Cambria" panose="02040503050406030204" pitchFamily="18" charset="0"/>
+                    <a:ea typeface="Cambria" panose="02040503050406030204" pitchFamily="18" charset="0"/>
+                    <a:cs typeface="Times New Roman" panose="02020603050405020304" pitchFamily="18" charset="0"/>
+                  </a:rPr>
+                  <a:t>h</a:t>
+                </a:r>
+                <a:r>
+                  <a:rPr lang="fr-FR" sz="1600" i="1" kern="100" dirty="0">
+                    <a:latin typeface="Cambria" panose="02040503050406030204" pitchFamily="18" charset="0"/>
+                    <a:ea typeface="Cambria" panose="02040503050406030204" pitchFamily="18" charset="0"/>
+                    <a:cs typeface="Times New Roman" panose="02020603050405020304" pitchFamily="18" charset="0"/>
+                  </a:rPr>
+                  <a:t>, and réaction </a:t>
+                </a:r>
+                <a:r>
+                  <a:rPr lang="fr-FR" sz="1600" i="1" kern="100" dirty="0" err="1">
+                    <a:latin typeface="Cambria" panose="02040503050406030204" pitchFamily="18" charset="0"/>
+                    <a:ea typeface="Cambria" panose="02040503050406030204" pitchFamily="18" charset="0"/>
+                    <a:cs typeface="Times New Roman" panose="02020603050405020304" pitchFamily="18" charset="0"/>
+                  </a:rPr>
+                  <a:t>r</a:t>
+                </a:r>
+                <a:r>
+                  <a:rPr lang="fr-FR" sz="1600" i="1" kern="100" baseline="-25000" dirty="0" err="1">
+                    <a:latin typeface="Cambria" panose="02040503050406030204" pitchFamily="18" charset="0"/>
+                    <a:ea typeface="Cambria" panose="02040503050406030204" pitchFamily="18" charset="0"/>
+                    <a:cs typeface="Times New Roman" panose="02020603050405020304" pitchFamily="18" charset="0"/>
+                  </a:rPr>
+                  <a:t>v</a:t>
+                </a:r>
+                <a:r>
+                  <a:rPr lang="fr-FR" sz="1600" i="1" kern="100" dirty="0">
+                    <a:latin typeface="Cambria" panose="02040503050406030204" pitchFamily="18" charset="0"/>
+                    <a:ea typeface="Cambria" panose="02040503050406030204" pitchFamily="18" charset="0"/>
+                    <a:cs typeface="Times New Roman" panose="02020603050405020304" pitchFamily="18" charset="0"/>
+                  </a:rPr>
+                  <a:t> for isotope i</a:t>
                 </a:r>
                 <a:r>
                   <a:rPr lang="fr-FR" sz="1600" i="1" kern="100" baseline="-25000" dirty="0">
@@ -15223,15 +15752,15 @@
                     <a:ea typeface="Cambria" panose="02040503050406030204" pitchFamily="18" charset="0"/>
                     <a:cs typeface="Times New Roman" panose="02020603050405020304" pitchFamily="18" charset="0"/>
                   </a:rPr>
-                  <a:t> de l’isotope i</a:t>
+                  <a:t>, in </a:t>
                 </a:r>
                 <a:r>
-                  <a:rPr lang="fr-FR" sz="1600" i="1" kern="100" baseline="-25000" dirty="0">
+                  <a:rPr lang="fr-FR" sz="1600" i="1" kern="100" dirty="0" err="1">
                     <a:latin typeface="Cambria" panose="02040503050406030204" pitchFamily="18" charset="0"/>
                     <a:ea typeface="Cambria" panose="02040503050406030204" pitchFamily="18" charset="0"/>
                     <a:cs typeface="Times New Roman" panose="02020603050405020304" pitchFamily="18" charset="0"/>
                   </a:rPr>
-                  <a:t>v</a:t>
+                  <a:t>energy</a:t>
                 </a:r>
                 <a:r>
                   <a:rPr lang="fr-FR" sz="1600" i="1" kern="100" dirty="0">
@@ -15239,7 +15768,7 @@
                     <a:ea typeface="Cambria" panose="02040503050406030204" pitchFamily="18" charset="0"/>
                     <a:cs typeface="Times New Roman" panose="02020603050405020304" pitchFamily="18" charset="0"/>
                   </a:rPr>
-                  <a:t>, dans un groupe d’énergies </a:t>
+                  <a:t> group </a:t>
                 </a:r>
                 <a:r>
                   <a:rPr lang="fr-FR" sz="1600" i="1" kern="100" dirty="0" err="1">
@@ -15263,7 +15792,7 @@
                     <a:ea typeface="Cambria" panose="02040503050406030204" pitchFamily="18" charset="0"/>
                     <a:cs typeface="Times New Roman" panose="02020603050405020304" pitchFamily="18" charset="0"/>
                   </a:rPr>
-                  <a:t> . A noter : </a:t>
+                  <a:t> . Note: </a:t>
                 </a:r>
                 <a14:m>
                   <m:oMath xmlns:m="http://schemas.openxmlformats.org/officeDocument/2006/math">
@@ -15448,7 +15977,23 @@
                     <a:ea typeface="Cambria" panose="02040503050406030204" pitchFamily="18" charset="0"/>
                     <a:cs typeface="Times New Roman" panose="02020603050405020304" pitchFamily="18" charset="0"/>
                   </a:rPr>
-                  <a:t>;  quand h=v.</a:t>
+                  <a:t>;  </a:t>
+                </a:r>
+                <a:r>
+                  <a:rPr lang="fr-FR" sz="1600" i="1" kern="100" dirty="0" err="1">
+                    <a:latin typeface="Cambria" panose="02040503050406030204" pitchFamily="18" charset="0"/>
+                    <a:ea typeface="Cambria" panose="02040503050406030204" pitchFamily="18" charset="0"/>
+                    <a:cs typeface="Times New Roman" panose="02020603050405020304" pitchFamily="18" charset="0"/>
+                  </a:rPr>
+                  <a:t>when</a:t>
+                </a:r>
+                <a:r>
+                  <a:rPr lang="fr-FR" sz="1600" i="1" kern="100" dirty="0">
+                    <a:latin typeface="Cambria" panose="02040503050406030204" pitchFamily="18" charset="0"/>
+                    <a:ea typeface="Cambria" panose="02040503050406030204" pitchFamily="18" charset="0"/>
+                    <a:cs typeface="Times New Roman" panose="02020603050405020304" pitchFamily="18" charset="0"/>
+                  </a:rPr>
+                  <a:t> h=v.</a:t>
                 </a:r>
                 <a:endParaRPr lang="fr-FR" sz="1600" i="1" kern="100" dirty="0">
                   <a:effectLst/>
@@ -15683,7 +16228,25 @@
                     <a:ea typeface="Cambria" panose="02040503050406030204" pitchFamily="18" charset="0"/>
                     <a:cs typeface="Times New Roman" panose="02020603050405020304" pitchFamily="18" charset="0"/>
                   </a:rPr>
-                  <a:t> : incertitude relative (</a:t>
+                  <a:t> : relative </a:t>
+                </a:r>
+                <a:r>
+                  <a:rPr lang="fr-FR" sz="1600" i="1" kern="100" dirty="0" err="1">
+                    <a:effectLst/>
+                    <a:latin typeface="Cambria" panose="02040503050406030204" pitchFamily="18" charset="0"/>
+                    <a:ea typeface="Cambria" panose="02040503050406030204" pitchFamily="18" charset="0"/>
+                    <a:cs typeface="Times New Roman" panose="02020603050405020304" pitchFamily="18" charset="0"/>
+                  </a:rPr>
+                  <a:t>uncertatiny</a:t>
+                </a:r>
+                <a:r>
+                  <a:rPr lang="fr-FR" sz="1600" i="1" kern="100" dirty="0">
+                    <a:effectLst/>
+                    <a:latin typeface="Cambria" panose="02040503050406030204" pitchFamily="18" charset="0"/>
+                    <a:ea typeface="Cambria" panose="02040503050406030204" pitchFamily="18" charset="0"/>
+                    <a:cs typeface="Times New Roman" panose="02020603050405020304" pitchFamily="18" charset="0"/>
+                  </a:rPr>
+                  <a:t> (</a:t>
                 </a:r>
                 <a:r>
                   <a:rPr lang="fr-FR" sz="1600" b="1" i="1" kern="100" dirty="0">
@@ -15692,7 +16255,7 @@
                     <a:ea typeface="Cambria" panose="02040503050406030204" pitchFamily="18" charset="0"/>
                     <a:cs typeface="Times New Roman" panose="02020603050405020304" pitchFamily="18" charset="0"/>
                   </a:rPr>
-                  <a:t>en %</a:t>
+                  <a:t>in %</a:t>
                 </a:r>
                 <a:r>
                   <a:rPr lang="fr-FR" sz="1600" i="1" kern="100" dirty="0">
@@ -15701,15 +16264,16 @@
                     <a:ea typeface="Cambria" panose="02040503050406030204" pitchFamily="18" charset="0"/>
                     <a:cs typeface="Times New Roman" panose="02020603050405020304" pitchFamily="18" charset="0"/>
                   </a:rPr>
-                  <a:t>) sur la section efficace microscopique </a:t>
+                  <a:t>) on </a:t>
                 </a:r>
                 <a:r>
-                  <a:rPr lang="fr-FR" sz="1600" i="1" kern="100" dirty="0">
+                  <a:rPr lang="fr-FR" sz="1600" i="1" kern="100" dirty="0" err="1">
+                    <a:effectLst/>
                     <a:latin typeface="Cambria" panose="02040503050406030204" pitchFamily="18" charset="0"/>
                     <a:ea typeface="Cambria" panose="02040503050406030204" pitchFamily="18" charset="0"/>
                     <a:cs typeface="Times New Roman" panose="02020603050405020304" pitchFamily="18" charset="0"/>
                   </a:rPr>
-                  <a:t>de la</a:t>
+                  <a:t>microscopic</a:t>
                 </a:r>
                 <a:r>
                   <a:rPr lang="fr-FR" sz="1600" i="1" kern="100" dirty="0">
@@ -15718,7 +16282,75 @@
                     <a:ea typeface="Cambria" panose="02040503050406030204" pitchFamily="18" charset="0"/>
                     <a:cs typeface="Times New Roman" panose="02020603050405020304" pitchFamily="18" charset="0"/>
                   </a:rPr>
-                  <a:t> réaction r de l’isotope i, dans un groupe d’énergie g.</a:t>
+                  <a:t> </a:t>
+                </a:r>
+                <a:r>
+                  <a:rPr lang="fr-FR" sz="1600" i="1" kern="100" dirty="0">
+                    <a:latin typeface="Cambria" panose="02040503050406030204" pitchFamily="18" charset="0"/>
+                    <a:ea typeface="Cambria" panose="02040503050406030204" pitchFamily="18" charset="0"/>
+                    <a:cs typeface="Times New Roman" panose="02020603050405020304" pitchFamily="18" charset="0"/>
+                  </a:rPr>
+                  <a:t>cross section of </a:t>
+                </a:r>
+                <a:r>
+                  <a:rPr lang="fr-FR" sz="1600" i="1" kern="100" dirty="0" err="1">
+                    <a:latin typeface="Cambria" panose="02040503050406030204" pitchFamily="18" charset="0"/>
+                    <a:ea typeface="Cambria" panose="02040503050406030204" pitchFamily="18" charset="0"/>
+                    <a:cs typeface="Times New Roman" panose="02020603050405020304" pitchFamily="18" charset="0"/>
+                  </a:rPr>
+                  <a:t>reaction</a:t>
+                </a:r>
+                <a:r>
+                  <a:rPr lang="fr-FR" sz="1600" i="1" kern="100" dirty="0">
+                    <a:latin typeface="Cambria" panose="02040503050406030204" pitchFamily="18" charset="0"/>
+                    <a:ea typeface="Cambria" panose="02040503050406030204" pitchFamily="18" charset="0"/>
+                    <a:cs typeface="Times New Roman" panose="02020603050405020304" pitchFamily="18" charset="0"/>
+                  </a:rPr>
+                  <a:t> </a:t>
+                </a:r>
+                <a:r>
+                  <a:rPr lang="fr-FR" sz="1600" i="1" kern="100" dirty="0">
+                    <a:effectLst/>
+                    <a:latin typeface="Cambria" panose="02040503050406030204" pitchFamily="18" charset="0"/>
+                    <a:ea typeface="Cambria" panose="02040503050406030204" pitchFamily="18" charset="0"/>
+                    <a:cs typeface="Times New Roman" panose="02020603050405020304" pitchFamily="18" charset="0"/>
+                  </a:rPr>
+                  <a:t>r </a:t>
+                </a:r>
+                <a:r>
+                  <a:rPr lang="fr-FR" sz="1600" i="1" kern="100" dirty="0">
+                    <a:latin typeface="Cambria" panose="02040503050406030204" pitchFamily="18" charset="0"/>
+                    <a:ea typeface="Cambria" panose="02040503050406030204" pitchFamily="18" charset="0"/>
+                    <a:cs typeface="Times New Roman" panose="02020603050405020304" pitchFamily="18" charset="0"/>
+                  </a:rPr>
+                  <a:t>of isotope </a:t>
+                </a:r>
+                <a:r>
+                  <a:rPr lang="fr-FR" sz="1600" i="1" kern="100" dirty="0">
+                    <a:effectLst/>
+                    <a:latin typeface="Cambria" panose="02040503050406030204" pitchFamily="18" charset="0"/>
+                    <a:ea typeface="Cambria" panose="02040503050406030204" pitchFamily="18" charset="0"/>
+                    <a:cs typeface="Times New Roman" panose="02020603050405020304" pitchFamily="18" charset="0"/>
+                  </a:rPr>
+                  <a:t>i, in </a:t>
+                </a:r>
+                <a:r>
+                  <a:rPr lang="fr-FR" sz="1600" i="1" kern="100" dirty="0" err="1">
+                    <a:effectLst/>
+                    <a:latin typeface="Cambria" panose="02040503050406030204" pitchFamily="18" charset="0"/>
+                    <a:ea typeface="Cambria" panose="02040503050406030204" pitchFamily="18" charset="0"/>
+                    <a:cs typeface="Times New Roman" panose="02020603050405020304" pitchFamily="18" charset="0"/>
+                  </a:rPr>
+                  <a:t>energy</a:t>
+                </a:r>
+                <a:r>
+                  <a:rPr lang="fr-FR" sz="1600" i="1" kern="100" dirty="0">
+                    <a:effectLst/>
+                    <a:latin typeface="Cambria" panose="02040503050406030204" pitchFamily="18" charset="0"/>
+                    <a:ea typeface="Cambria" panose="02040503050406030204" pitchFamily="18" charset="0"/>
+                    <a:cs typeface="Times New Roman" panose="02020603050405020304" pitchFamily="18" charset="0"/>
+                  </a:rPr>
+                  <a:t> group g.</a:t>
                 </a:r>
                 <a:r>
                   <a:rPr lang="fr-FR" sz="1200" kern="100" dirty="0">
@@ -15756,8 +16388,8 @@
             </p:nvSpPr>
             <p:spPr>
               <a:xfrm>
-                <a:off x="921509" y="3618010"/>
-                <a:ext cx="10650855" cy="2994602"/>
+                <a:off x="921509" y="3549642"/>
+                <a:ext cx="10650855" cy="3205749"/>
               </a:xfrm>
               <a:prstGeom prst="rect">
                 <a:avLst/>
@@ -15765,7 +16397,7 @@
               <a:blipFill>
                 <a:blip r:embed="rId3"/>
                 <a:stretch>
-                  <a:fillRect t="-609" r="-172"/>
+                  <a:fillRect t="-568" b="-1136"/>
                 </a:stretch>
               </a:blipFill>
               <a:ln w="12700">
@@ -15779,7 +16411,7 @@
               <a:lstStyle/>
               <a:p>
                 <a:r>
-                  <a:rPr lang="fr-FR">
+                  <a:rPr lang="en-US">
                     <a:noFill/>
                   </a:rPr>
                   <a:t> </a:t>
@@ -15804,7 +16436,7 @@
         <p:spPr>
           <a:xfrm>
             <a:off x="4316810" y="245388"/>
-            <a:ext cx="4188070" cy="523220"/>
+            <a:ext cx="3817712" cy="523220"/>
           </a:xfrm>
           <a:prstGeom prst="rect">
             <a:avLst/>
@@ -15831,7 +16463,7 @@
                 <a:ea typeface="Cambria" panose="02040503050406030204" pitchFamily="18" charset="0"/>
                 <a:cs typeface="Times New Roman" panose="02020603050405020304" pitchFamily="18" charset="0"/>
               </a:rPr>
-              <a:t> : matrice de variances-covariances</a:t>
+              <a:t> : variances-covariances matrix</a:t>
             </a:r>
           </a:p>
         </p:txBody>
@@ -16137,7 +16769,7 @@
         <p:spPr>
           <a:xfrm>
             <a:off x="3524575" y="369101"/>
-            <a:ext cx="4188070" cy="523220"/>
+            <a:ext cx="3817712" cy="523220"/>
           </a:xfrm>
           <a:prstGeom prst="rect">
             <a:avLst/>
@@ -16164,7 +16796,7 @@
                 <a:ea typeface="Cambria" panose="02040503050406030204" pitchFamily="18" charset="0"/>
                 <a:cs typeface="Times New Roman" panose="02020603050405020304" pitchFamily="18" charset="0"/>
               </a:rPr>
-              <a:t> : matrice de variances-covariances</a:t>
+              <a:t> : variances-covariances matrix</a:t>
             </a:r>
           </a:p>
         </p:txBody>
@@ -19529,7 +20161,7 @@
         <p:spPr>
           <a:xfrm>
             <a:off x="3143225" y="4803742"/>
-            <a:ext cx="3072286" cy="1200329"/>
+            <a:ext cx="3072286" cy="1477328"/>
           </a:xfrm>
           <a:prstGeom prst="rect">
             <a:avLst/>
@@ -19564,21 +20196,72 @@
                 <a:ea typeface="Cambria" panose="02040503050406030204" pitchFamily="18" charset="0"/>
                 <a:cs typeface="Times New Roman" panose="02020603050405020304" pitchFamily="18" charset="0"/>
               </a:rPr>
-              <a:t> : sous-matrice de variances-covariances entre la réaction 0 de l’isotope 0 et la réaction R de </a:t>
+              <a:t> : variances-covariances </a:t>
             </a:r>
             <a:r>
-              <a:rPr lang="fr-FR" i="1">
+              <a:rPr lang="fr-FR" i="1" dirty="0" err="1">
                 <a:latin typeface="Cambria" panose="02040503050406030204" pitchFamily="18" charset="0"/>
                 <a:ea typeface="Cambria" panose="02040503050406030204" pitchFamily="18" charset="0"/>
                 <a:cs typeface="Times New Roman" panose="02020603050405020304" pitchFamily="18" charset="0"/>
               </a:rPr>
-              <a:t>l’isotope I.</a:t>
+              <a:t>sub</a:t>
             </a:r>
-            <a:endParaRPr lang="fr-FR" i="1" dirty="0">
-              <a:latin typeface="Cambria" panose="02040503050406030204" pitchFamily="18" charset="0"/>
-              <a:ea typeface="Cambria" panose="02040503050406030204" pitchFamily="18" charset="0"/>
-              <a:cs typeface="Times New Roman" panose="02020603050405020304" pitchFamily="18" charset="0"/>
-            </a:endParaRPr>
+            <a:r>
+              <a:rPr lang="fr-FR" i="1" dirty="0">
+                <a:latin typeface="Cambria" panose="02040503050406030204" pitchFamily="18" charset="0"/>
+                <a:ea typeface="Cambria" panose="02040503050406030204" pitchFamily="18" charset="0"/>
+                <a:cs typeface="Times New Roman" panose="02020603050405020304" pitchFamily="18" charset="0"/>
+              </a:rPr>
+              <a:t>-matrix </a:t>
+            </a:r>
+            <a:r>
+              <a:rPr lang="fr-FR" i="1" dirty="0" err="1">
+                <a:latin typeface="Cambria" panose="02040503050406030204" pitchFamily="18" charset="0"/>
+                <a:ea typeface="Cambria" panose="02040503050406030204" pitchFamily="18" charset="0"/>
+                <a:cs typeface="Times New Roman" panose="02020603050405020304" pitchFamily="18" charset="0"/>
+              </a:rPr>
+              <a:t>between</a:t>
+            </a:r>
+            <a:r>
+              <a:rPr lang="fr-FR" i="1" dirty="0">
+                <a:latin typeface="Cambria" panose="02040503050406030204" pitchFamily="18" charset="0"/>
+                <a:ea typeface="Cambria" panose="02040503050406030204" pitchFamily="18" charset="0"/>
+                <a:cs typeface="Times New Roman" panose="02020603050405020304" pitchFamily="18" charset="0"/>
+              </a:rPr>
+              <a:t> the </a:t>
+            </a:r>
+            <a:r>
+              <a:rPr lang="fr-FR" i="1" dirty="0" err="1">
+                <a:latin typeface="Cambria" panose="02040503050406030204" pitchFamily="18" charset="0"/>
+                <a:ea typeface="Cambria" panose="02040503050406030204" pitchFamily="18" charset="0"/>
+                <a:cs typeface="Times New Roman" panose="02020603050405020304" pitchFamily="18" charset="0"/>
+              </a:rPr>
+              <a:t>reaction</a:t>
+            </a:r>
+            <a:r>
+              <a:rPr lang="fr-FR" i="1" dirty="0">
+                <a:latin typeface="Cambria" panose="02040503050406030204" pitchFamily="18" charset="0"/>
+                <a:ea typeface="Cambria" panose="02040503050406030204" pitchFamily="18" charset="0"/>
+                <a:cs typeface="Times New Roman" panose="02020603050405020304" pitchFamily="18" charset="0"/>
+              </a:rPr>
+              <a:t> 0 of isotope 0 and the </a:t>
+            </a:r>
+            <a:r>
+              <a:rPr lang="fr-FR" i="1" dirty="0" err="1">
+                <a:latin typeface="Cambria" panose="02040503050406030204" pitchFamily="18" charset="0"/>
+                <a:ea typeface="Cambria" panose="02040503050406030204" pitchFamily="18" charset="0"/>
+                <a:cs typeface="Times New Roman" panose="02020603050405020304" pitchFamily="18" charset="0"/>
+              </a:rPr>
+              <a:t>reaction</a:t>
+            </a:r>
+            <a:r>
+              <a:rPr lang="fr-FR" i="1" dirty="0">
+                <a:latin typeface="Cambria" panose="02040503050406030204" pitchFamily="18" charset="0"/>
+                <a:ea typeface="Cambria" panose="02040503050406030204" pitchFamily="18" charset="0"/>
+                <a:cs typeface="Times New Roman" panose="02020603050405020304" pitchFamily="18" charset="0"/>
+              </a:rPr>
+              <a:t> R of isotope I.</a:t>
+            </a:r>
           </a:p>
         </p:txBody>
       </p:sp>
@@ -19993,7 +20676,63 @@
                 <a:ea typeface="Cambria" panose="02040503050406030204" pitchFamily="18" charset="0"/>
                 <a:cs typeface="Times New Roman" panose="02020603050405020304" pitchFamily="18" charset="0"/>
               </a:rPr>
-              <a:t>liste isotope-réaction :</a:t>
+              <a:t>isotope-</a:t>
+            </a:r>
+            <a:r>
+              <a:rPr lang="fr-FR" sz="1400" u="sng" spc="600" dirty="0" err="1">
+                <a:solidFill>
+                  <a:schemeClr val="accent1">
+                    <a:lumMod val="60000"/>
+                    <a:lumOff val="40000"/>
+                  </a:schemeClr>
+                </a:solidFill>
+                <a:latin typeface="Cambria" panose="02040503050406030204" pitchFamily="18" charset="0"/>
+                <a:ea typeface="Cambria" panose="02040503050406030204" pitchFamily="18" charset="0"/>
+                <a:cs typeface="Times New Roman" panose="02020603050405020304" pitchFamily="18" charset="0"/>
+              </a:rPr>
+              <a:t>reaction</a:t>
+            </a:r>
+            <a:r>
+              <a:rPr lang="fr-FR" sz="1400" u="sng" spc="600" dirty="0">
+                <a:solidFill>
+                  <a:schemeClr val="accent1">
+                    <a:lumMod val="60000"/>
+                    <a:lumOff val="40000"/>
+                  </a:schemeClr>
+                </a:solidFill>
+                <a:latin typeface="Cambria" panose="02040503050406030204" pitchFamily="18" charset="0"/>
+                <a:ea typeface="Cambria" panose="02040503050406030204" pitchFamily="18" charset="0"/>
+                <a:cs typeface="Times New Roman" panose="02020603050405020304" pitchFamily="18" charset="0"/>
+              </a:rPr>
+              <a:t> </a:t>
+            </a:r>
+            <a:r>
+              <a:rPr lang="fr-FR" sz="1400" u="sng" spc="600" dirty="0" err="1">
+                <a:solidFill>
+                  <a:schemeClr val="accent1">
+                    <a:lumMod val="60000"/>
+                    <a:lumOff val="40000"/>
+                  </a:schemeClr>
+                </a:solidFill>
+                <a:latin typeface="Cambria" panose="02040503050406030204" pitchFamily="18" charset="0"/>
+                <a:ea typeface="Cambria" panose="02040503050406030204" pitchFamily="18" charset="0"/>
+                <a:cs typeface="Times New Roman" panose="02020603050405020304" pitchFamily="18" charset="0"/>
+              </a:rPr>
+              <a:t>list</a:t>
+            </a:r>
+            <a:r>
+              <a:rPr lang="fr-FR" sz="1400" u="sng" spc="600" dirty="0">
+                <a:solidFill>
+                  <a:schemeClr val="accent1">
+                    <a:lumMod val="60000"/>
+                    <a:lumOff val="40000"/>
+                  </a:schemeClr>
+                </a:solidFill>
+                <a:latin typeface="Cambria" panose="02040503050406030204" pitchFamily="18" charset="0"/>
+                <a:ea typeface="Cambria" panose="02040503050406030204" pitchFamily="18" charset="0"/>
+                <a:cs typeface="Times New Roman" panose="02020603050405020304" pitchFamily="18" charset="0"/>
+              </a:rPr>
+              <a:t>:</a:t>
             </a:r>
           </a:p>
         </p:txBody>
@@ -20462,7 +21201,31 @@
                 <a:ea typeface="Cambria" panose="02040503050406030204" pitchFamily="18" charset="0"/>
                 <a:cs typeface="Times New Roman" panose="02020603050405020304" pitchFamily="18" charset="0"/>
               </a:rPr>
-              <a:t>:  vecteur de C-E benchmarks</a:t>
+              <a:t>:  </a:t>
+            </a:r>
+            <a:r>
+              <a:rPr lang="fr-FR" sz="2000" dirty="0" err="1">
+                <a:latin typeface="Cambria" panose="02040503050406030204" pitchFamily="18" charset="0"/>
+                <a:ea typeface="Cambria" panose="02040503050406030204" pitchFamily="18" charset="0"/>
+                <a:cs typeface="Times New Roman" panose="02020603050405020304" pitchFamily="18" charset="0"/>
+              </a:rPr>
+              <a:t>experimental</a:t>
+            </a:r>
+            <a:r>
+              <a:rPr lang="fr-FR" sz="2000" dirty="0">
+                <a:latin typeface="Cambria" panose="02040503050406030204" pitchFamily="18" charset="0"/>
+                <a:ea typeface="Cambria" panose="02040503050406030204" pitchFamily="18" charset="0"/>
+                <a:cs typeface="Times New Roman" panose="02020603050405020304" pitchFamily="18" charset="0"/>
+              </a:rPr>
+              <a:t> C-E </a:t>
+            </a:r>
+            <a:r>
+              <a:rPr lang="fr-FR" sz="2000" dirty="0" err="1">
+                <a:latin typeface="Cambria" panose="02040503050406030204" pitchFamily="18" charset="0"/>
+                <a:ea typeface="Cambria" panose="02040503050406030204" pitchFamily="18" charset="0"/>
+                <a:cs typeface="Times New Roman" panose="02020603050405020304" pitchFamily="18" charset="0"/>
+              </a:rPr>
+              <a:t>vector</a:t>
             </a:r>
             <a:endParaRPr lang="fr-FR" dirty="0">
               <a:latin typeface="Cambria" panose="02040503050406030204" pitchFamily="18" charset="0"/>
@@ -20747,16 +21510,40 @@
                     <a:ea typeface="Cambria" panose="02040503050406030204" pitchFamily="18" charset="0"/>
                     <a:cs typeface="Times New Roman" panose="02020603050405020304" pitchFamily="18" charset="0"/>
                   </a:rPr>
-                  <a:t>: écart relatif entre le k</a:t>
+                  <a:t>: relativ</a:t>
                 </a:r>
                 <a:r>
-                  <a:rPr lang="fr-FR" sz="1800" i="1" kern="100" baseline="-25000" dirty="0">
+                  <a:rPr lang="fr-FR" i="1" kern="100" dirty="0">
+                    <a:latin typeface="Cambria" panose="02040503050406030204" pitchFamily="18" charset="0"/>
+                    <a:ea typeface="Cambria" panose="02040503050406030204" pitchFamily="18" charset="0"/>
+                    <a:cs typeface="Times New Roman" panose="02020603050405020304" pitchFamily="18" charset="0"/>
+                  </a:rPr>
+                  <a:t>e </a:t>
+                </a:r>
+                <a:r>
+                  <a:rPr lang="fr-FR" i="1" kern="100" dirty="0" err="1">
+                    <a:latin typeface="Cambria" panose="02040503050406030204" pitchFamily="18" charset="0"/>
+                    <a:ea typeface="Cambria" panose="02040503050406030204" pitchFamily="18" charset="0"/>
+                    <a:cs typeface="Times New Roman" panose="02020603050405020304" pitchFamily="18" charset="0"/>
+                  </a:rPr>
+                  <a:t>discrepancy</a:t>
+                </a:r>
+                <a:r>
+                  <a:rPr lang="fr-FR" i="1" kern="100" dirty="0">
+                    <a:latin typeface="Cambria" panose="02040503050406030204" pitchFamily="18" charset="0"/>
+                    <a:ea typeface="Cambria" panose="02040503050406030204" pitchFamily="18" charset="0"/>
+                    <a:cs typeface="Times New Roman" panose="02020603050405020304" pitchFamily="18" charset="0"/>
+                  </a:rPr>
+                  <a:t> </a:t>
+                </a:r>
+                <a:r>
+                  <a:rPr lang="fr-FR" sz="1800" i="1" kern="100" dirty="0" err="1">
                     <a:effectLst/>
                     <a:latin typeface="Cambria" panose="02040503050406030204" pitchFamily="18" charset="0"/>
                     <a:ea typeface="Cambria" panose="02040503050406030204" pitchFamily="18" charset="0"/>
                     <a:cs typeface="Times New Roman" panose="02020603050405020304" pitchFamily="18" charset="0"/>
                   </a:rPr>
-                  <a:t>eff</a:t>
+                  <a:t>between</a:t>
                 </a:r>
                 <a:r>
                   <a:rPr lang="fr-FR" sz="1800" i="1" kern="100" dirty="0">
@@ -20765,7 +21552,67 @@
                     <a:ea typeface="Cambria" panose="02040503050406030204" pitchFamily="18" charset="0"/>
                     <a:cs typeface="Times New Roman" panose="02020603050405020304" pitchFamily="18" charset="0"/>
                   </a:rPr>
-                  <a:t> calculé et expérimental, </a:t>
+                  <a:t> </a:t>
+                </a:r>
+                <a:r>
+                  <a:rPr lang="fr-FR" sz="1800" i="1" kern="100" dirty="0" err="1">
+                    <a:effectLst/>
+                    <a:latin typeface="Cambria" panose="02040503050406030204" pitchFamily="18" charset="0"/>
+                    <a:ea typeface="Cambria" panose="02040503050406030204" pitchFamily="18" charset="0"/>
+                    <a:cs typeface="Times New Roman" panose="02020603050405020304" pitchFamily="18" charset="0"/>
+                  </a:rPr>
+                  <a:t>calculated</a:t>
+                </a:r>
+                <a:r>
+                  <a:rPr lang="fr-FR" sz="1800" i="1" kern="100" dirty="0">
+                    <a:effectLst/>
+                    <a:latin typeface="Cambria" panose="02040503050406030204" pitchFamily="18" charset="0"/>
+                    <a:ea typeface="Cambria" panose="02040503050406030204" pitchFamily="18" charset="0"/>
+                    <a:cs typeface="Times New Roman" panose="02020603050405020304" pitchFamily="18" charset="0"/>
+                  </a:rPr>
+                  <a:t> and </a:t>
+                </a:r>
+                <a:r>
+                  <a:rPr lang="fr-FR" sz="1800" i="1" kern="100" dirty="0" err="1">
+                    <a:effectLst/>
+                    <a:latin typeface="Cambria" panose="02040503050406030204" pitchFamily="18" charset="0"/>
+                    <a:ea typeface="Cambria" panose="02040503050406030204" pitchFamily="18" charset="0"/>
+                    <a:cs typeface="Times New Roman" panose="02020603050405020304" pitchFamily="18" charset="0"/>
+                  </a:rPr>
+                  <a:t>experimental</a:t>
+                </a:r>
+                <a:r>
+                  <a:rPr lang="fr-FR" i="1" kern="100" dirty="0">
+                    <a:latin typeface="Cambria" panose="02040503050406030204" pitchFamily="18" charset="0"/>
+                    <a:ea typeface="Cambria" panose="02040503050406030204" pitchFamily="18" charset="0"/>
+                    <a:cs typeface="Times New Roman" panose="02020603050405020304" pitchFamily="18" charset="0"/>
+                  </a:rPr>
+                  <a:t> k</a:t>
+                </a:r>
+                <a:r>
+                  <a:rPr lang="fr-FR" i="1" kern="100" baseline="-25000" dirty="0">
+                    <a:latin typeface="Cambria" panose="02040503050406030204" pitchFamily="18" charset="0"/>
+                    <a:ea typeface="Cambria" panose="02040503050406030204" pitchFamily="18" charset="0"/>
+                    <a:cs typeface="Times New Roman" panose="02020603050405020304" pitchFamily="18" charset="0"/>
+                  </a:rPr>
+                  <a:t>eff</a:t>
+                </a:r>
+                <a:r>
+                  <a:rPr lang="fr-FR" i="1" kern="100" dirty="0">
+                    <a:latin typeface="Cambria" panose="02040503050406030204" pitchFamily="18" charset="0"/>
+                    <a:ea typeface="Cambria" panose="02040503050406030204" pitchFamily="18" charset="0"/>
+                    <a:cs typeface="Times New Roman" panose="02020603050405020304" pitchFamily="18" charset="0"/>
+                  </a:rPr>
+                  <a:t> </a:t>
+                </a:r>
+                <a:r>
+                  <a:rPr lang="fr-FR" sz="1800" i="1" kern="100" dirty="0">
+                    <a:effectLst/>
+                    <a:latin typeface="Cambria" panose="02040503050406030204" pitchFamily="18" charset="0"/>
+                    <a:ea typeface="Cambria" panose="02040503050406030204" pitchFamily="18" charset="0"/>
+                    <a:cs typeface="Times New Roman" panose="02020603050405020304" pitchFamily="18" charset="0"/>
+                  </a:rPr>
+                  <a:t>, </a:t>
                 </a:r>
                 <a:r>
                   <a:rPr lang="fr-FR" sz="1800" b="1" i="1" kern="100" dirty="0">
@@ -20774,7 +21621,7 @@
                     <a:ea typeface="Cambria" panose="02040503050406030204" pitchFamily="18" charset="0"/>
                     <a:cs typeface="Times New Roman" panose="02020603050405020304" pitchFamily="18" charset="0"/>
                   </a:rPr>
-                  <a:t>en %</a:t>
+                  <a:t>in %</a:t>
                 </a:r>
                 <a:r>
                   <a:rPr lang="fr-FR" sz="1800" i="1" kern="100" dirty="0">
@@ -20801,12 +21648,52 @@
                   </a:spcAft>
                 </a:pPr>
                 <a:r>
+                  <a:rPr lang="fr-FR" i="1" kern="100" dirty="0" err="1">
+                    <a:latin typeface="Cambria" panose="02040503050406030204" pitchFamily="18" charset="0"/>
+                    <a:ea typeface="Cambria" panose="02040503050406030204" pitchFamily="18" charset="0"/>
+                    <a:cs typeface="Times New Roman" panose="02020603050405020304" pitchFamily="18" charset="0"/>
+                  </a:rPr>
+                  <a:t>With</a:t>
+                </a:r>
+                <a:r>
                   <a:rPr lang="fr-FR" i="1" kern="100" dirty="0">
                     <a:latin typeface="Cambria" panose="02040503050406030204" pitchFamily="18" charset="0"/>
                     <a:ea typeface="Cambria" panose="02040503050406030204" pitchFamily="18" charset="0"/>
                     <a:cs typeface="Times New Roman" panose="02020603050405020304" pitchFamily="18" charset="0"/>
                   </a:rPr>
-                  <a:t>Avec j allant du cas benchmark 0 à J.</a:t>
+                  <a:t> j </a:t>
+                </a:r>
+                <a:r>
+                  <a:rPr lang="fr-FR" i="1" kern="100" dirty="0" err="1">
+                    <a:latin typeface="Cambria" panose="02040503050406030204" pitchFamily="18" charset="0"/>
+                    <a:ea typeface="Cambria" panose="02040503050406030204" pitchFamily="18" charset="0"/>
+                    <a:cs typeface="Times New Roman" panose="02020603050405020304" pitchFamily="18" charset="0"/>
+                  </a:rPr>
+                  <a:t>going</a:t>
+                </a:r>
+                <a:r>
+                  <a:rPr lang="fr-FR" i="1" kern="100" dirty="0">
+                    <a:latin typeface="Cambria" panose="02040503050406030204" pitchFamily="18" charset="0"/>
+                    <a:ea typeface="Cambria" panose="02040503050406030204" pitchFamily="18" charset="0"/>
+                    <a:cs typeface="Times New Roman" panose="02020603050405020304" pitchFamily="18" charset="0"/>
+                  </a:rPr>
+                  <a:t> </a:t>
+                </a:r>
+                <a:r>
+                  <a:rPr lang="fr-FR" i="1" kern="100" dirty="0" err="1">
+                    <a:latin typeface="Cambria" panose="02040503050406030204" pitchFamily="18" charset="0"/>
+                    <a:ea typeface="Cambria" panose="02040503050406030204" pitchFamily="18" charset="0"/>
+                    <a:cs typeface="Times New Roman" panose="02020603050405020304" pitchFamily="18" charset="0"/>
+                  </a:rPr>
+                  <a:t>from</a:t>
+                </a:r>
+                <a:r>
+                  <a:rPr lang="fr-FR" i="1" kern="100" dirty="0">
+                    <a:latin typeface="Cambria" panose="02040503050406030204" pitchFamily="18" charset="0"/>
+                    <a:ea typeface="Cambria" panose="02040503050406030204" pitchFamily="18" charset="0"/>
+                    <a:cs typeface="Times New Roman" panose="02020603050405020304" pitchFamily="18" charset="0"/>
+                  </a:rPr>
+                  <a:t> benchmark case 0 to J.</a:t>
                 </a:r>
                 <a:endParaRPr lang="fr-FR" kern="100" dirty="0">
                   <a:effectLst/>
@@ -20858,7 +21745,7 @@
               <a:lstStyle/>
               <a:p>
                 <a:r>
-                  <a:rPr lang="fr-FR">
+                  <a:rPr lang="en-US">
                     <a:noFill/>
                   </a:rPr>
                   <a:t> </a:t>
@@ -21997,8 +22884,8 @@
           <a:chExt cx="0" cy="0"/>
         </a:xfrm>
       </p:grpSpPr>
-      <mc:AlternateContent xmlns:mc="http://schemas.openxmlformats.org/markup-compatibility/2006">
-        <mc:Choice xmlns:a14="http://schemas.microsoft.com/office/drawing/2010/main" Requires="a14">
+      <mc:AlternateContent xmlns:mc="http://schemas.openxmlformats.org/markup-compatibility/2006" xmlns:a14="http://schemas.microsoft.com/office/drawing/2010/main">
+        <mc:Choice Requires="a14">
           <p:graphicFrame>
             <p:nvGraphicFramePr>
               <p:cNvPr id="4" name="Table 3">
@@ -23503,7 +24390,7 @@
             </a:graphic>
           </p:graphicFrame>
         </mc:Choice>
-        <mc:Fallback>
+        <mc:Fallback xmlns="">
           <p:graphicFrame>
             <p:nvGraphicFramePr>
               <p:cNvPr id="4" name="Table 3">
@@ -24768,8 +25655,8 @@
         </p:nvSpPr>
         <p:spPr>
           <a:xfrm>
-            <a:off x="8636002" y="1994623"/>
-            <a:ext cx="3367311" cy="1062470"/>
+            <a:off x="8567762" y="1994623"/>
+            <a:ext cx="3455914" cy="1062470"/>
           </a:xfrm>
           <a:prstGeom prst="rect">
             <a:avLst/>
@@ -24803,7 +25690,7 @@
                 <a:ea typeface="Cambria" panose="02040503050406030204" pitchFamily="18" charset="0"/>
                 <a:cs typeface="Times New Roman" panose="02020603050405020304" pitchFamily="18" charset="0"/>
               </a:rPr>
-              <a:t>Matrice diagonale</a:t>
+              <a:t>Diagonal matrix</a:t>
             </a:r>
           </a:p>
           <a:p>
@@ -24823,7 +25710,39 @@
                 <a:ea typeface="Cambria" panose="02040503050406030204" pitchFamily="18" charset="0"/>
                 <a:cs typeface="Times New Roman" panose="02020603050405020304" pitchFamily="18" charset="0"/>
               </a:rPr>
-              <a:t>j : indice parcourant tous les cas benchmarks de 0 à J.</a:t>
+              <a:t>j : index </a:t>
+            </a:r>
+            <a:r>
+              <a:rPr lang="fr-FR" i="1" kern="100" dirty="0" err="1">
+                <a:latin typeface="Cambria" panose="02040503050406030204" pitchFamily="18" charset="0"/>
+                <a:ea typeface="Cambria" panose="02040503050406030204" pitchFamily="18" charset="0"/>
+                <a:cs typeface="Times New Roman" panose="02020603050405020304" pitchFamily="18" charset="0"/>
+              </a:rPr>
+              <a:t>going</a:t>
+            </a:r>
+            <a:r>
+              <a:rPr lang="fr-FR" i="1" kern="100" dirty="0">
+                <a:latin typeface="Cambria" panose="02040503050406030204" pitchFamily="18" charset="0"/>
+                <a:ea typeface="Cambria" panose="02040503050406030204" pitchFamily="18" charset="0"/>
+                <a:cs typeface="Times New Roman" panose="02020603050405020304" pitchFamily="18" charset="0"/>
+              </a:rPr>
+              <a:t> over all benchmark cases </a:t>
+            </a:r>
+            <a:r>
+              <a:rPr lang="fr-FR" i="1" kern="100" dirty="0" err="1">
+                <a:latin typeface="Cambria" panose="02040503050406030204" pitchFamily="18" charset="0"/>
+                <a:ea typeface="Cambria" panose="02040503050406030204" pitchFamily="18" charset="0"/>
+                <a:cs typeface="Times New Roman" panose="02020603050405020304" pitchFamily="18" charset="0"/>
+              </a:rPr>
+              <a:t>from</a:t>
+            </a:r>
+            <a:r>
+              <a:rPr lang="fr-FR" i="1" kern="100" dirty="0">
+                <a:latin typeface="Cambria" panose="02040503050406030204" pitchFamily="18" charset="0"/>
+                <a:ea typeface="Cambria" panose="02040503050406030204" pitchFamily="18" charset="0"/>
+                <a:cs typeface="Times New Roman" panose="02020603050405020304" pitchFamily="18" charset="0"/>
+              </a:rPr>
+              <a:t> 0 to J.</a:t>
             </a:r>
             <a:endParaRPr lang="fr-FR" sz="2000" i="1" kern="100" dirty="0">
               <a:effectLst/>
@@ -24851,7 +25770,7 @@
             <p:spPr>
               <a:xfrm>
                 <a:off x="444689" y="4741354"/>
-                <a:ext cx="11302621" cy="1991113"/>
+                <a:ext cx="11302621" cy="1569721"/>
               </a:xfrm>
               <a:prstGeom prst="roundRect">
                 <a:avLst/>
@@ -24885,6 +25804,14 @@
                   </a:spcAft>
                 </a:pPr>
                 <a:r>
+                  <a:rPr lang="en-US" sz="1400" i="1" kern="100" dirty="0">
+                    <a:latin typeface="Cambria" panose="02040503050406030204" pitchFamily="18" charset="0"/>
+                    <a:ea typeface="Cambria" panose="02040503050406030204" pitchFamily="18" charset="0"/>
+                    <a:cs typeface="Times New Roman" panose="02020603050405020304" pitchFamily="18" charset="0"/>
+                  </a:rPr>
+                  <a:t>The theory described in the SCALE 6.3.1 user manual (Section 6.8.4.2) indicates the presence of a diagonal (“E/C”) matrix on both sides of the experimental uncertainty matrix, thereby transforming its terms into experimental uncertainties relative to the calculated keff</a:t>
+                </a:r>
+                <a:r>
                   <a:rPr lang="fr-FR" sz="1400" i="1" kern="100" dirty="0">
                     <a:solidFill>
                       <a:schemeClr val="tx1"/>
@@ -24894,7 +25821,29 @@
                     <a:ea typeface="Cambria" panose="02040503050406030204" pitchFamily="18" charset="0"/>
                     <a:cs typeface="Times New Roman" panose="02020603050405020304" pitchFamily="18" charset="0"/>
                   </a:rPr>
-                  <a:t>La théorie décrite dans le manuel utilisateur de SCALE 6.3.1 (chapitre 6.8.4.2) indique la présence d’une matrice diagonale (« E/C ») de part et d’autre de la matrice d’incertitudes expérimentales, changeant les termes ci-dessus en incertitudes expérimentales relatives aux valeurs du keff calculé : </a:t>
+                  <a:t> :</a:t>
+                </a:r>
+              </a:p>
+              <a:p>
+                <a:pPr marL="228600">
+                  <a:lnSpc>
+                    <a:spcPct val="107000"/>
+                  </a:lnSpc>
+                  <a:spcAft>
+                    <a:spcPts val="800"/>
+                  </a:spcAft>
+                </a:pPr>
+                <a:r>
+                  <a:rPr lang="fr-FR" sz="1400" i="1" kern="100" dirty="0">
+                    <a:solidFill>
+                      <a:schemeClr val="tx1"/>
+                    </a:solidFill>
+                    <a:effectLst/>
+                    <a:latin typeface="Cambria" panose="02040503050406030204" pitchFamily="18" charset="0"/>
+                    <a:ea typeface="Cambria" panose="02040503050406030204" pitchFamily="18" charset="0"/>
+                    <a:cs typeface="Times New Roman" panose="02020603050405020304" pitchFamily="18" charset="0"/>
+                  </a:rPr>
+                  <a:t> </a:t>
                 </a:r>
                 <a14:m>
                   <m:oMath xmlns:m="http://schemas.openxmlformats.org/officeDocument/2006/math">
@@ -25312,34 +26261,6 @@
                   <a:cs typeface="Times New Roman" panose="02020603050405020304" pitchFamily="18" charset="0"/>
                 </a:endParaRPr>
               </a:p>
-              <a:p>
-                <a:pPr marL="228600">
-                  <a:lnSpc>
-                    <a:spcPct val="107000"/>
-                  </a:lnSpc>
-                  <a:spcAft>
-                    <a:spcPts val="800"/>
-                  </a:spcAft>
-                </a:pPr>
-                <a:r>
-                  <a:rPr lang="fr-FR" sz="1200" i="1" kern="100" dirty="0">
-                    <a:solidFill>
-                      <a:schemeClr val="tx1"/>
-                    </a:solidFill>
-                    <a:effectLst/>
-                    <a:latin typeface="Cambria" panose="02040503050406030204" pitchFamily="18" charset="0"/>
-                    <a:ea typeface="Cambria" panose="02040503050406030204" pitchFamily="18" charset="0"/>
-                    <a:cs typeface="Times New Roman" panose="02020603050405020304" pitchFamily="18" charset="0"/>
-                  </a:rPr>
-                  <a:t>(L’outil de propagation d’incertitudes MACSENS utilisant la méthode GLLS ne semble pas utiliser les valeurs d’incertitudes expérimentales relatives aux valeurs du keff calculé, mais bien relatives au keff expérimental.)</a:t>
-                </a:r>
-                <a:endParaRPr lang="fr-FR" sz="1200" i="1" kern="100" dirty="0">
-                  <a:effectLst/>
-                  <a:latin typeface="Cambria" panose="02040503050406030204" pitchFamily="18" charset="0"/>
-                  <a:ea typeface="Cambria" panose="02040503050406030204" pitchFamily="18" charset="0"/>
-                  <a:cs typeface="Times New Roman" panose="02020603050405020304" pitchFamily="18" charset="0"/>
-                </a:endParaRPr>
-              </a:p>
             </p:txBody>
           </p:sp>
         </mc:Choice>
@@ -25361,7 +26282,7 @@
             <p:spPr>
               <a:xfrm>
                 <a:off x="444689" y="4741354"/>
-                <a:ext cx="11302621" cy="1991113"/>
+                <a:ext cx="11302621" cy="1569721"/>
               </a:xfrm>
               <a:prstGeom prst="roundRect">
                 <a:avLst/>
@@ -25385,7 +26306,7 @@
               <a:lstStyle/>
               <a:p>
                 <a:r>
-                  <a:rPr lang="fr-FR">
+                  <a:rPr lang="en-US">
                     <a:noFill/>
                   </a:rPr>
                   <a:t> </a:t>
@@ -25617,7 +26538,7 @@
         <p:spPr>
           <a:xfrm>
             <a:off x="3348502" y="86002"/>
-            <a:ext cx="5089470" cy="523220"/>
+            <a:ext cx="4746877" cy="523220"/>
           </a:xfrm>
           <a:prstGeom prst="rect">
             <a:avLst/>
@@ -25652,7 +26573,55 @@
                 <a:ea typeface="Cambria" panose="02040503050406030204" pitchFamily="18" charset="0"/>
                 <a:cs typeface="Times New Roman" panose="02020603050405020304" pitchFamily="18" charset="0"/>
               </a:rPr>
-              <a:t> : matrice d'incertitudes keff benchmarks</a:t>
+              <a:t> : </a:t>
+            </a:r>
+            <a:r>
+              <a:rPr lang="fr-FR" dirty="0" err="1">
+                <a:latin typeface="Cambria" panose="02040503050406030204" pitchFamily="18" charset="0"/>
+                <a:ea typeface="Cambria" panose="02040503050406030204" pitchFamily="18" charset="0"/>
+                <a:cs typeface="Times New Roman" panose="02020603050405020304" pitchFamily="18" charset="0"/>
+              </a:rPr>
+              <a:t>experimental</a:t>
+            </a:r>
+            <a:r>
+              <a:rPr lang="fr-FR" dirty="0">
+                <a:latin typeface="Cambria" panose="02040503050406030204" pitchFamily="18" charset="0"/>
+                <a:ea typeface="Cambria" panose="02040503050406030204" pitchFamily="18" charset="0"/>
+                <a:cs typeface="Times New Roman" panose="02020603050405020304" pitchFamily="18" charset="0"/>
+              </a:rPr>
+              <a:t> k</a:t>
+            </a:r>
+            <a:r>
+              <a:rPr lang="fr-FR" baseline="-25000" dirty="0">
+                <a:latin typeface="Cambria" panose="02040503050406030204" pitchFamily="18" charset="0"/>
+                <a:ea typeface="Cambria" panose="02040503050406030204" pitchFamily="18" charset="0"/>
+                <a:cs typeface="Times New Roman" panose="02020603050405020304" pitchFamily="18" charset="0"/>
+              </a:rPr>
+              <a:t>eff</a:t>
+            </a:r>
+            <a:r>
+              <a:rPr lang="fr-FR" dirty="0">
+                <a:latin typeface="Cambria" panose="02040503050406030204" pitchFamily="18" charset="0"/>
+                <a:ea typeface="Cambria" panose="02040503050406030204" pitchFamily="18" charset="0"/>
+                <a:cs typeface="Times New Roman" panose="02020603050405020304" pitchFamily="18" charset="0"/>
+              </a:rPr>
+              <a:t> </a:t>
+            </a:r>
+            <a:r>
+              <a:rPr lang="fr-FR" dirty="0" err="1">
+                <a:latin typeface="Cambria" panose="02040503050406030204" pitchFamily="18" charset="0"/>
+                <a:ea typeface="Cambria" panose="02040503050406030204" pitchFamily="18" charset="0"/>
+                <a:cs typeface="Times New Roman" panose="02020603050405020304" pitchFamily="18" charset="0"/>
+              </a:rPr>
+              <a:t>uncertainty</a:t>
+            </a:r>
+            <a:r>
+              <a:rPr lang="fr-FR" dirty="0">
+                <a:latin typeface="Cambria" panose="02040503050406030204" pitchFamily="18" charset="0"/>
+                <a:ea typeface="Cambria" panose="02040503050406030204" pitchFamily="18" charset="0"/>
+                <a:cs typeface="Times New Roman" panose="02020603050405020304" pitchFamily="18" charset="0"/>
+              </a:rPr>
+              <a:t> matrix</a:t>
             </a:r>
           </a:p>
         </p:txBody>
@@ -27498,7 +28467,7 @@
         <p:spPr>
           <a:xfrm>
             <a:off x="3561057" y="57928"/>
-            <a:ext cx="5473999" cy="646331"/>
+            <a:ext cx="5099345" cy="646331"/>
           </a:xfrm>
           <a:prstGeom prst="rect">
             <a:avLst/>
@@ -27541,7 +28510,39 @@
                 <a:ea typeface="Cambria" panose="02040503050406030204" pitchFamily="18" charset="0"/>
                 <a:cs typeface="Times New Roman" panose="02020603050405020304" pitchFamily="18" charset="0"/>
               </a:rPr>
-              <a:t>: matrice des sensibilités benchmarks</a:t>
+              <a:t>: </a:t>
+            </a:r>
+            <a:r>
+              <a:rPr lang="fr-FR" sz="2000" dirty="0" err="1">
+                <a:latin typeface="Cambria" panose="02040503050406030204" pitchFamily="18" charset="0"/>
+                <a:ea typeface="Cambria" panose="02040503050406030204" pitchFamily="18" charset="0"/>
+                <a:cs typeface="Times New Roman" panose="02020603050405020304" pitchFamily="18" charset="0"/>
+              </a:rPr>
+              <a:t>experimental</a:t>
+            </a:r>
+            <a:r>
+              <a:rPr lang="fr-FR" sz="2000" dirty="0">
+                <a:latin typeface="Cambria" panose="02040503050406030204" pitchFamily="18" charset="0"/>
+                <a:ea typeface="Cambria" panose="02040503050406030204" pitchFamily="18" charset="0"/>
+                <a:cs typeface="Times New Roman" panose="02020603050405020304" pitchFamily="18" charset="0"/>
+              </a:rPr>
+              <a:t> </a:t>
+            </a:r>
+            <a:r>
+              <a:rPr lang="fr-FR" sz="2000" dirty="0" err="1">
+                <a:latin typeface="Cambria" panose="02040503050406030204" pitchFamily="18" charset="0"/>
+                <a:ea typeface="Cambria" panose="02040503050406030204" pitchFamily="18" charset="0"/>
+                <a:cs typeface="Times New Roman" panose="02020603050405020304" pitchFamily="18" charset="0"/>
+              </a:rPr>
+              <a:t>sensitivities</a:t>
+            </a:r>
+            <a:r>
+              <a:rPr lang="fr-FR" sz="2000" dirty="0">
+                <a:latin typeface="Cambria" panose="02040503050406030204" pitchFamily="18" charset="0"/>
+                <a:ea typeface="Cambria" panose="02040503050406030204" pitchFamily="18" charset="0"/>
+                <a:cs typeface="Times New Roman" panose="02020603050405020304" pitchFamily="18" charset="0"/>
+              </a:rPr>
+              <a:t> matrix</a:t>
             </a:r>
             <a:endParaRPr lang="fr-FR" dirty="0">
               <a:latin typeface="Cambria" panose="02040503050406030204" pitchFamily="18" charset="0"/>
@@ -27551,8 +28552,8 @@
           </a:p>
         </p:txBody>
       </p:sp>
-      <mc:AlternateContent xmlns:mc="http://schemas.openxmlformats.org/markup-compatibility/2006" xmlns:a14="http://schemas.microsoft.com/office/drawing/2010/main">
-        <mc:Choice Requires="a14">
+      <mc:AlternateContent xmlns:mc="http://schemas.openxmlformats.org/markup-compatibility/2006">
+        <mc:Choice xmlns:a14="http://schemas.microsoft.com/office/drawing/2010/main" Requires="a14">
           <p:sp>
             <p:nvSpPr>
               <p:cNvPr id="21" name="TextBox 20">
@@ -27567,8 +28568,8 @@
             </p:nvSpPr>
             <p:spPr>
               <a:xfrm>
-                <a:off x="2009107" y="5484517"/>
-                <a:ext cx="9920554" cy="1249381"/>
+                <a:off x="1866936" y="5502717"/>
+                <a:ext cx="9920554" cy="1029641"/>
               </a:xfrm>
               <a:prstGeom prst="rect">
                 <a:avLst/>
@@ -27599,8 +28600,7 @@
                     <m:sSubSup>
                       <m:sSubSupPr>
                         <m:ctrlPr>
-                          <a:rPr lang="fr-FR" sz="1800" i="1" kern="100" smtClean="0">
-                            <a:effectLst/>
+                          <a:rPr lang="fr-FR" sz="1600" i="1" kern="100">
                             <a:latin typeface="Cambria Math" panose="02040503050406030204" pitchFamily="18" charset="0"/>
                             <a:ea typeface="Times New Roman" panose="02020603050405020304" pitchFamily="18" charset="0"/>
                             <a:cs typeface="Times New Roman" panose="02020603050405020304" pitchFamily="18" charset="0"/>
@@ -27609,8 +28609,7 @@
                       </m:sSubSupPr>
                       <m:e>
                         <m:r>
-                          <a:rPr lang="fr-FR" sz="1800" i="1" kern="100">
-                            <a:effectLst/>
+                          <a:rPr lang="fr-FR" sz="1600" i="1" kern="100">
                             <a:latin typeface="Cambria Math" panose="02040503050406030204" pitchFamily="18" charset="0"/>
                             <a:ea typeface="Times New Roman" panose="02020603050405020304" pitchFamily="18" charset="0"/>
                             <a:cs typeface="Times New Roman" panose="02020603050405020304" pitchFamily="18" charset="0"/>
@@ -27620,8 +28619,7 @@
                       </m:e>
                       <m:sub>
                         <m:r>
-                          <a:rPr lang="fr-FR" sz="1800" i="1" kern="100">
-                            <a:effectLst/>
+                          <a:rPr lang="fr-FR" sz="1600" i="1" kern="100">
                             <a:latin typeface="Cambria Math" panose="02040503050406030204" pitchFamily="18" charset="0"/>
                             <a:ea typeface="Times New Roman" panose="02020603050405020304" pitchFamily="18" charset="0"/>
                             <a:cs typeface="Times New Roman" panose="02020603050405020304" pitchFamily="18" charset="0"/>
@@ -27631,8 +28629,7 @@
                       </m:sub>
                       <m:sup>
                         <m:r>
-                          <a:rPr lang="fr-FR" sz="1800" i="1" kern="100">
-                            <a:effectLst/>
+                          <a:rPr lang="fr-FR" sz="1600" i="1" kern="100">
                             <a:latin typeface="Cambria Math" panose="02040503050406030204" pitchFamily="18" charset="0"/>
                             <a:ea typeface="Times New Roman" panose="02020603050405020304" pitchFamily="18" charset="0"/>
                             <a:cs typeface="Times New Roman" panose="02020603050405020304" pitchFamily="18" charset="0"/>
@@ -27640,8 +28637,7 @@
                           <m:t>𝑖</m:t>
                         </m:r>
                         <m:r>
-                          <a:rPr lang="fr-FR" sz="1800" i="1" kern="100">
-                            <a:effectLst/>
+                          <a:rPr lang="fr-FR" sz="1600" i="1" kern="100">
                             <a:latin typeface="Cambria Math" panose="02040503050406030204" pitchFamily="18" charset="0"/>
                             <a:ea typeface="Times New Roman" panose="02020603050405020304" pitchFamily="18" charset="0"/>
                             <a:cs typeface="Times New Roman" panose="02020603050405020304" pitchFamily="18" charset="0"/>
@@ -27649,8 +28645,7 @@
                           <m:t>, </m:t>
                         </m:r>
                         <m:r>
-                          <a:rPr lang="fr-FR" sz="1800" i="1" kern="100">
-                            <a:effectLst/>
+                          <a:rPr lang="fr-FR" sz="1600" i="1" kern="100">
                             <a:latin typeface="Cambria Math" panose="02040503050406030204" pitchFamily="18" charset="0"/>
                             <a:ea typeface="Times New Roman" panose="02020603050405020304" pitchFamily="18" charset="0"/>
                             <a:cs typeface="Times New Roman" panose="02020603050405020304" pitchFamily="18" charset="0"/>
@@ -27660,8 +28655,7 @@
                       </m:sup>
                     </m:sSubSup>
                     <m:r>
-                      <a:rPr lang="fr-FR" sz="1800" i="1" kern="100">
-                        <a:effectLst/>
+                      <a:rPr lang="fr-FR" sz="1600" i="1" kern="100">
                         <a:latin typeface="Cambria Math" panose="02040503050406030204" pitchFamily="18" charset="0"/>
                         <a:ea typeface="Times New Roman" panose="02020603050405020304" pitchFamily="18" charset="0"/>
                         <a:cs typeface="Times New Roman" panose="02020603050405020304" pitchFamily="18" charset="0"/>
@@ -27671,8 +28665,7 @@
                     <m:f>
                       <m:fPr>
                         <m:ctrlPr>
-                          <a:rPr lang="fr-FR" sz="1800" i="1" kern="100">
-                            <a:effectLst/>
+                          <a:rPr lang="fr-FR" sz="1600" i="1" kern="100">
                             <a:latin typeface="Cambria Math" panose="02040503050406030204" pitchFamily="18" charset="0"/>
                             <a:ea typeface="Times New Roman" panose="02020603050405020304" pitchFamily="18" charset="0"/>
                             <a:cs typeface="Times New Roman" panose="02020603050405020304" pitchFamily="18" charset="0"/>
@@ -27681,8 +28674,7 @@
                       </m:fPr>
                       <m:num>
                         <m:r>
-                          <a:rPr lang="fr-FR" sz="1800" i="1" kern="100">
-                            <a:effectLst/>
+                          <a:rPr lang="fr-FR" sz="1600" i="1" kern="100">
                             <a:latin typeface="Cambria Math" panose="02040503050406030204" pitchFamily="18" charset="0"/>
                             <a:ea typeface="Times New Roman" panose="02020603050405020304" pitchFamily="18" charset="0"/>
                             <a:cs typeface="Times New Roman" panose="02020603050405020304" pitchFamily="18" charset="0"/>
@@ -27692,8 +28684,7 @@
                         <m:sSub>
                           <m:sSubPr>
                             <m:ctrlPr>
-                              <a:rPr lang="fr-FR" sz="1800" i="1" kern="100">
-                                <a:effectLst/>
+                              <a:rPr lang="fr-FR" sz="1600" i="1" kern="100">
                                 <a:latin typeface="Cambria Math" panose="02040503050406030204" pitchFamily="18" charset="0"/>
                                 <a:ea typeface="Times New Roman" panose="02020603050405020304" pitchFamily="18" charset="0"/>
                                 <a:cs typeface="Times New Roman" panose="02020603050405020304" pitchFamily="18" charset="0"/>
@@ -27702,8 +28693,7 @@
                           </m:sSubPr>
                           <m:e>
                             <m:r>
-                              <a:rPr lang="fr-FR" sz="1800" i="1" kern="100">
-                                <a:effectLst/>
+                              <a:rPr lang="fr-FR" sz="1600" i="1" kern="100">
                                 <a:latin typeface="Cambria Math" panose="02040503050406030204" pitchFamily="18" charset="0"/>
                                 <a:ea typeface="Times New Roman" panose="02020603050405020304" pitchFamily="18" charset="0"/>
                                 <a:cs typeface="Times New Roman" panose="02020603050405020304" pitchFamily="18" charset="0"/>
@@ -27713,8 +28703,7 @@
                           </m:e>
                           <m:sub>
                             <m:r>
-                              <a:rPr lang="fr-FR" sz="1800" i="1" kern="100">
-                                <a:effectLst/>
+                              <a:rPr lang="fr-FR" sz="1600" i="1" kern="100">
                                 <a:latin typeface="Cambria Math" panose="02040503050406030204" pitchFamily="18" charset="0"/>
                                 <a:ea typeface="Times New Roman" panose="02020603050405020304" pitchFamily="18" charset="0"/>
                                 <a:cs typeface="Times New Roman" panose="02020603050405020304" pitchFamily="18" charset="0"/>
@@ -27726,8 +28715,7 @@
                       </m:num>
                       <m:den>
                         <m:r>
-                          <a:rPr lang="fr-FR" sz="1800" i="1" kern="100">
-                            <a:effectLst/>
+                          <a:rPr lang="fr-FR" sz="1600" i="1" kern="100">
                             <a:latin typeface="Cambria Math" panose="02040503050406030204" pitchFamily="18" charset="0"/>
                             <a:ea typeface="Times New Roman" panose="02020603050405020304" pitchFamily="18" charset="0"/>
                             <a:cs typeface="Times New Roman" panose="02020603050405020304" pitchFamily="18" charset="0"/>
@@ -27737,8 +28725,7 @@
                         <m:sSub>
                           <m:sSubPr>
                             <m:ctrlPr>
-                              <a:rPr lang="fr-FR" sz="1800" i="1" kern="100">
-                                <a:effectLst/>
+                              <a:rPr lang="fr-FR" sz="1600" i="1" kern="100">
                                 <a:latin typeface="Cambria Math" panose="02040503050406030204" pitchFamily="18" charset="0"/>
                                 <a:ea typeface="Times New Roman" panose="02020603050405020304" pitchFamily="18" charset="0"/>
                                 <a:cs typeface="Times New Roman" panose="02020603050405020304" pitchFamily="18" charset="0"/>
@@ -27747,8 +28734,7 @@
                           </m:sSubPr>
                           <m:e>
                             <m:r>
-                              <a:rPr lang="fr-FR" sz="1800" i="1" kern="100">
-                                <a:effectLst/>
+                              <a:rPr lang="fr-FR" sz="1600" i="1" kern="100">
                                 <a:latin typeface="Cambria Math" panose="02040503050406030204" pitchFamily="18" charset="0"/>
                                 <a:ea typeface="Times New Roman" panose="02020603050405020304" pitchFamily="18" charset="0"/>
                                 <a:cs typeface="Times New Roman" panose="02020603050405020304" pitchFamily="18" charset="0"/>
@@ -27758,8 +28744,7 @@
                           </m:e>
                           <m:sub>
                             <m:r>
-                              <a:rPr lang="fr-FR" sz="1800" i="1" kern="100">
-                                <a:effectLst/>
+                              <a:rPr lang="fr-FR" sz="1600" i="1" kern="100">
                                 <a:latin typeface="Cambria Math" panose="02040503050406030204" pitchFamily="18" charset="0"/>
                                 <a:ea typeface="Times New Roman" panose="02020603050405020304" pitchFamily="18" charset="0"/>
                                 <a:cs typeface="Times New Roman" panose="02020603050405020304" pitchFamily="18" charset="0"/>
@@ -27773,8 +28758,7 @@
                   </m:oMath>
                 </a14:m>
                 <a:r>
-                  <a:rPr lang="fr-FR" sz="1800" kern="100" dirty="0">
-                    <a:effectLst/>
+                  <a:rPr lang="fr-FR" sz="1600" kern="100" dirty="0">
                     <a:latin typeface="Cambria" panose="02040503050406030204" pitchFamily="18" charset="0"/>
                     <a:ea typeface="Cambria" panose="02040503050406030204" pitchFamily="18" charset="0"/>
                     <a:cs typeface="Times New Roman" panose="02020603050405020304" pitchFamily="18" charset="0"/>
@@ -27782,17 +28766,15 @@
                   <a:t>   </a:t>
                 </a:r>
                 <a:r>
-                  <a:rPr lang="fr-FR" sz="1800" i="1" kern="100" dirty="0">
-                    <a:effectLst/>
+                  <a:rPr lang="fr-FR" sz="1600" i="1" kern="100" dirty="0">
                     <a:latin typeface="Cambria" panose="02040503050406030204" pitchFamily="18" charset="0"/>
                     <a:ea typeface="Cambria" panose="02040503050406030204" pitchFamily="18" charset="0"/>
                     <a:cs typeface="Times New Roman" panose="02020603050405020304" pitchFamily="18" charset="0"/>
                   </a:rPr>
-                  <a:t>: variation du k</a:t>
+                  <a:t>: variation of k</a:t>
                 </a:r>
                 <a:r>
-                  <a:rPr lang="fr-FR" sz="1800" i="1" kern="100" baseline="-25000" dirty="0">
-                    <a:effectLst/>
+                  <a:rPr lang="fr-FR" sz="1600" i="1" kern="100" baseline="-25000" dirty="0">
                     <a:latin typeface="Cambria" panose="02040503050406030204" pitchFamily="18" charset="0"/>
                     <a:ea typeface="Cambria" panose="02040503050406030204" pitchFamily="18" charset="0"/>
                     <a:cs typeface="Times New Roman" panose="02020603050405020304" pitchFamily="18" charset="0"/>
@@ -27800,8 +28782,7 @@
                   <a:t>eff</a:t>
                 </a:r>
                 <a:r>
-                  <a:rPr lang="fr-FR" sz="1800" i="1" kern="100" dirty="0">
-                    <a:effectLst/>
+                  <a:rPr lang="fr-FR" sz="1600" i="1" kern="100" dirty="0">
                     <a:latin typeface="Cambria" panose="02040503050406030204" pitchFamily="18" charset="0"/>
                     <a:ea typeface="Cambria" panose="02040503050406030204" pitchFamily="18" charset="0"/>
                     <a:cs typeface="Times New Roman" panose="02020603050405020304" pitchFamily="18" charset="0"/>
@@ -27809,8 +28790,7 @@
                   <a:t> (∆k</a:t>
                 </a:r>
                 <a:r>
-                  <a:rPr lang="fr-FR" sz="1800" i="1" kern="100" baseline="-25000" dirty="0">
-                    <a:effectLst/>
+                  <a:rPr lang="fr-FR" sz="1600" i="1" kern="100" baseline="-25000" dirty="0">
                     <a:latin typeface="Cambria" panose="02040503050406030204" pitchFamily="18" charset="0"/>
                     <a:ea typeface="Cambria" panose="02040503050406030204" pitchFamily="18" charset="0"/>
                     <a:cs typeface="Times New Roman" panose="02020603050405020304" pitchFamily="18" charset="0"/>
@@ -27818,8 +28798,7 @@
                   <a:t>eff</a:t>
                 </a:r>
                 <a:r>
-                  <a:rPr lang="fr-FR" sz="1800" i="1" kern="100" dirty="0">
-                    <a:effectLst/>
+                  <a:rPr lang="fr-FR" sz="1600" i="1" kern="100" dirty="0">
                     <a:latin typeface="Cambria" panose="02040503050406030204" pitchFamily="18" charset="0"/>
                     <a:ea typeface="Cambria" panose="02040503050406030204" pitchFamily="18" charset="0"/>
                     <a:cs typeface="Times New Roman" panose="02020603050405020304" pitchFamily="18" charset="0"/>
@@ -27827,86 +28806,310 @@
                   <a:t> ) </a:t>
                 </a:r>
                 <a:r>
-                  <a:rPr lang="fr-FR" sz="1800" b="1" i="1" kern="100" dirty="0">
-                    <a:effectLst/>
+                  <a:rPr lang="fr-FR" sz="1600" b="1" i="1" kern="100" dirty="0">
                     <a:latin typeface="Cambria" panose="02040503050406030204" pitchFamily="18" charset="0"/>
                     <a:ea typeface="Cambria" panose="02040503050406030204" pitchFamily="18" charset="0"/>
                     <a:cs typeface="Times New Roman" panose="02020603050405020304" pitchFamily="18" charset="0"/>
                   </a:rPr>
-                  <a:t>en %</a:t>
+                  <a:t>in %</a:t>
                 </a:r>
                 <a:r>
-                  <a:rPr lang="fr-FR" sz="1800" i="1" kern="100" dirty="0">
-                    <a:effectLst/>
+                  <a:rPr lang="fr-FR" sz="1600" i="1" kern="100" dirty="0">
                     <a:latin typeface="Cambria" panose="02040503050406030204" pitchFamily="18" charset="0"/>
                     <a:ea typeface="Cambria" panose="02040503050406030204" pitchFamily="18" charset="0"/>
                     <a:cs typeface="Times New Roman" panose="02020603050405020304" pitchFamily="18" charset="0"/>
                   </a:rPr>
-                  <a:t>, induite par la variation de la section efficace microscopique (∆XS) </a:t>
+                  <a:t>, </a:t>
                 </a:r>
                 <a:r>
-                  <a:rPr lang="fr-FR" sz="1800" b="1" i="1" kern="100" dirty="0">
-                    <a:effectLst/>
+                  <a:rPr lang="fr-FR" sz="1600" i="1" kern="100" dirty="0" err="1">
                     <a:latin typeface="Cambria" panose="02040503050406030204" pitchFamily="18" charset="0"/>
                     <a:ea typeface="Cambria" panose="02040503050406030204" pitchFamily="18" charset="0"/>
                     <a:cs typeface="Times New Roman" panose="02020603050405020304" pitchFamily="18" charset="0"/>
                   </a:rPr>
-                  <a:t>en %</a:t>
+                  <a:t>induced</a:t>
                 </a:r>
                 <a:r>
-                  <a:rPr lang="fr-FR" sz="1800" i="1" kern="100" dirty="0">
-                    <a:effectLst/>
+                  <a:rPr lang="fr-FR" sz="1600" i="1" kern="100" dirty="0">
                     <a:latin typeface="Cambria" panose="02040503050406030204" pitchFamily="18" charset="0"/>
                     <a:ea typeface="Cambria" panose="02040503050406030204" pitchFamily="18" charset="0"/>
                     <a:cs typeface="Times New Roman" panose="02020603050405020304" pitchFamily="18" charset="0"/>
                   </a:rPr>
-                  <a:t> aussi, </a:t>
+                  <a:t> by the variation of the </a:t>
                 </a:r>
                 <a:r>
-                  <a:rPr lang="fr-FR" i="1" kern="100" dirty="0">
+                  <a:rPr lang="fr-FR" sz="1600" i="1" kern="100" dirty="0" err="1">
                     <a:latin typeface="Cambria" panose="02040503050406030204" pitchFamily="18" charset="0"/>
                     <a:ea typeface="Cambria" panose="02040503050406030204" pitchFamily="18" charset="0"/>
                     <a:cs typeface="Times New Roman" panose="02020603050405020304" pitchFamily="18" charset="0"/>
                   </a:rPr>
-                  <a:t>de la</a:t>
+                  <a:t>microscopic</a:t>
                 </a:r>
                 <a:r>
-                  <a:rPr lang="fr-FR" sz="1800" i="1" kern="100" dirty="0">
-                    <a:effectLst/>
+                  <a:rPr lang="fr-FR" sz="1600" i="1" kern="100" dirty="0">
                     <a:latin typeface="Cambria" panose="02040503050406030204" pitchFamily="18" charset="0"/>
                     <a:ea typeface="Cambria" panose="02040503050406030204" pitchFamily="18" charset="0"/>
                     <a:cs typeface="Times New Roman" panose="02020603050405020304" pitchFamily="18" charset="0"/>
                   </a:rPr>
-                  <a:t> réaction r de l’isotope i, dans un groupe d’énergie g</a:t>
+                  <a:t> cross section (∆XS) </a:t>
                 </a:r>
                 <a:r>
-                  <a:rPr lang="fr-FR" i="1" kern="100" dirty="0">
+                  <a:rPr lang="fr-FR" sz="1600" b="1" i="1" kern="100" dirty="0">
                     <a:latin typeface="Cambria" panose="02040503050406030204" pitchFamily="18" charset="0"/>
                     <a:ea typeface="Cambria" panose="02040503050406030204" pitchFamily="18" charset="0"/>
                     <a:cs typeface="Times New Roman" panose="02020603050405020304" pitchFamily="18" charset="0"/>
                   </a:rPr>
-                  <a:t>.</a:t>
+                  <a:t>in %</a:t>
                 </a:r>
-              </a:p>
-              <a:p>
-                <a:pPr marL="228600">
-                  <a:lnSpc>
-                    <a:spcPct val="107000"/>
-                  </a:lnSpc>
-                  <a:spcAft>
-                    <a:spcPts val="800"/>
-                  </a:spcAft>
-                </a:pPr>
                 <a:r>
-                  <a:rPr lang="fr-FR" i="1" kern="100" dirty="0">
+                  <a:rPr lang="fr-FR" sz="1600" i="1" kern="100" dirty="0">
                     <a:latin typeface="Cambria" panose="02040503050406030204" pitchFamily="18" charset="0"/>
                     <a:ea typeface="Cambria" panose="02040503050406030204" pitchFamily="18" charset="0"/>
                     <a:cs typeface="Times New Roman" panose="02020603050405020304" pitchFamily="18" charset="0"/>
                   </a:rPr>
-                  <a:t>Avec i allant de l’isotope 0 à I, r allant de la réaction 0 à R, et g allant du groupe d’énergie 0 à G.</a:t>
+                  <a:t> </a:t>
                 </a:r>
-                <a:endParaRPr lang="fr-FR" kern="100" dirty="0">
-                  <a:effectLst/>
+                <a:r>
+                  <a:rPr lang="fr-FR" sz="1600" i="1" kern="100" dirty="0" err="1">
+                    <a:latin typeface="Cambria" panose="02040503050406030204" pitchFamily="18" charset="0"/>
+                    <a:ea typeface="Cambria" panose="02040503050406030204" pitchFamily="18" charset="0"/>
+                    <a:cs typeface="Times New Roman" panose="02020603050405020304" pitchFamily="18" charset="0"/>
+                  </a:rPr>
+                  <a:t>too</a:t>
+                </a:r>
+                <a:r>
+                  <a:rPr lang="fr-FR" sz="1600" i="1" kern="100" dirty="0">
+                    <a:latin typeface="Cambria" panose="02040503050406030204" pitchFamily="18" charset="0"/>
+                    <a:ea typeface="Cambria" panose="02040503050406030204" pitchFamily="18" charset="0"/>
+                    <a:cs typeface="Times New Roman" panose="02020603050405020304" pitchFamily="18" charset="0"/>
+                  </a:rPr>
+                  <a:t>, of </a:t>
+                </a:r>
+                <a:r>
+                  <a:rPr lang="fr-FR" sz="1600" i="1" kern="100" dirty="0" err="1">
+                    <a:latin typeface="Cambria" panose="02040503050406030204" pitchFamily="18" charset="0"/>
+                    <a:ea typeface="Cambria" panose="02040503050406030204" pitchFamily="18" charset="0"/>
+                    <a:cs typeface="Times New Roman" panose="02020603050405020304" pitchFamily="18" charset="0"/>
+                  </a:rPr>
+                  <a:t>reaction</a:t>
+                </a:r>
+                <a:r>
+                  <a:rPr lang="fr-FR" sz="1600" i="1" kern="100" dirty="0">
+                    <a:latin typeface="Cambria" panose="02040503050406030204" pitchFamily="18" charset="0"/>
+                    <a:ea typeface="Cambria" panose="02040503050406030204" pitchFamily="18" charset="0"/>
+                    <a:cs typeface="Times New Roman" panose="02020603050405020304" pitchFamily="18" charset="0"/>
+                  </a:rPr>
+                  <a:t> r for isotope i, in </a:t>
+                </a:r>
+                <a:r>
+                  <a:rPr lang="fr-FR" sz="1600" i="1" kern="100" dirty="0" err="1">
+                    <a:latin typeface="Cambria" panose="02040503050406030204" pitchFamily="18" charset="0"/>
+                    <a:ea typeface="Cambria" panose="02040503050406030204" pitchFamily="18" charset="0"/>
+                    <a:cs typeface="Times New Roman" panose="02020603050405020304" pitchFamily="18" charset="0"/>
+                  </a:rPr>
+                  <a:t>energy</a:t>
+                </a:r>
+                <a:r>
+                  <a:rPr lang="fr-FR" sz="1600" i="1" kern="100" dirty="0">
+                    <a:latin typeface="Cambria" panose="02040503050406030204" pitchFamily="18" charset="0"/>
+                    <a:ea typeface="Cambria" panose="02040503050406030204" pitchFamily="18" charset="0"/>
+                    <a:cs typeface="Times New Roman" panose="02020603050405020304" pitchFamily="18" charset="0"/>
+                  </a:rPr>
+                  <a:t> group g. </a:t>
+                </a:r>
+                <a:r>
+                  <a:rPr lang="fr-FR" sz="1600" i="1" kern="100" dirty="0" err="1">
+                    <a:latin typeface="Cambria" panose="02040503050406030204" pitchFamily="18" charset="0"/>
+                    <a:ea typeface="Cambria" panose="02040503050406030204" pitchFamily="18" charset="0"/>
+                    <a:cs typeface="Times New Roman" panose="02020603050405020304" pitchFamily="18" charset="0"/>
+                  </a:rPr>
+                  <a:t>With</a:t>
+                </a:r>
+                <a:r>
+                  <a:rPr lang="fr-FR" sz="1600" i="1" kern="100" dirty="0">
+                    <a:latin typeface="Cambria" panose="02040503050406030204" pitchFamily="18" charset="0"/>
+                    <a:ea typeface="Cambria" panose="02040503050406030204" pitchFamily="18" charset="0"/>
+                    <a:cs typeface="Times New Roman" panose="02020603050405020304" pitchFamily="18" charset="0"/>
+                  </a:rPr>
+                  <a:t> i </a:t>
+                </a:r>
+                <a:r>
+                  <a:rPr lang="fr-FR" sz="1600" i="1" kern="100" dirty="0" err="1">
+                    <a:latin typeface="Cambria" panose="02040503050406030204" pitchFamily="18" charset="0"/>
+                    <a:ea typeface="Cambria" panose="02040503050406030204" pitchFamily="18" charset="0"/>
+                    <a:cs typeface="Times New Roman" panose="02020603050405020304" pitchFamily="18" charset="0"/>
+                  </a:rPr>
+                  <a:t>going</a:t>
+                </a:r>
+                <a:r>
+                  <a:rPr lang="fr-FR" sz="1600" i="1" kern="100" dirty="0">
+                    <a:latin typeface="Cambria" panose="02040503050406030204" pitchFamily="18" charset="0"/>
+                    <a:ea typeface="Cambria" panose="02040503050406030204" pitchFamily="18" charset="0"/>
+                    <a:cs typeface="Times New Roman" panose="02020603050405020304" pitchFamily="18" charset="0"/>
+                  </a:rPr>
+                  <a:t> </a:t>
+                </a:r>
+                <a:r>
+                  <a:rPr lang="fr-FR" sz="1600" i="1" kern="100" dirty="0" err="1">
+                    <a:latin typeface="Cambria" panose="02040503050406030204" pitchFamily="18" charset="0"/>
+                    <a:ea typeface="Cambria" panose="02040503050406030204" pitchFamily="18" charset="0"/>
+                    <a:cs typeface="Times New Roman" panose="02020603050405020304" pitchFamily="18" charset="0"/>
+                  </a:rPr>
+                  <a:t>from</a:t>
+                </a:r>
+                <a:r>
+                  <a:rPr lang="fr-FR" sz="1600" i="1" kern="100" dirty="0">
+                    <a:latin typeface="Cambria" panose="02040503050406030204" pitchFamily="18" charset="0"/>
+                    <a:ea typeface="Cambria" panose="02040503050406030204" pitchFamily="18" charset="0"/>
+                    <a:cs typeface="Times New Roman" panose="02020603050405020304" pitchFamily="18" charset="0"/>
+                  </a:rPr>
+                  <a:t> isotope 0 to I, r </a:t>
+                </a:r>
+                <a:r>
+                  <a:rPr lang="fr-FR" sz="1600" i="1" kern="100" dirty="0" err="1">
+                    <a:latin typeface="Cambria" panose="02040503050406030204" pitchFamily="18" charset="0"/>
+                    <a:ea typeface="Cambria" panose="02040503050406030204" pitchFamily="18" charset="0"/>
+                    <a:cs typeface="Times New Roman" panose="02020603050405020304" pitchFamily="18" charset="0"/>
+                  </a:rPr>
+                  <a:t>going</a:t>
+                </a:r>
+                <a:r>
+                  <a:rPr lang="fr-FR" sz="1600" i="1" kern="100" dirty="0">
+                    <a:latin typeface="Cambria" panose="02040503050406030204" pitchFamily="18" charset="0"/>
+                    <a:ea typeface="Cambria" panose="02040503050406030204" pitchFamily="18" charset="0"/>
+                    <a:cs typeface="Times New Roman" panose="02020603050405020304" pitchFamily="18" charset="0"/>
+                  </a:rPr>
+                  <a:t> </a:t>
+                </a:r>
+                <a:r>
+                  <a:rPr lang="fr-FR" sz="1600" i="1" kern="100" dirty="0" err="1">
+                    <a:latin typeface="Cambria" panose="02040503050406030204" pitchFamily="18" charset="0"/>
+                    <a:ea typeface="Cambria" panose="02040503050406030204" pitchFamily="18" charset="0"/>
+                    <a:cs typeface="Times New Roman" panose="02020603050405020304" pitchFamily="18" charset="0"/>
+                  </a:rPr>
+                  <a:t>from</a:t>
+                </a:r>
+                <a:r>
+                  <a:rPr lang="fr-FR" sz="1600" i="1" kern="100" dirty="0">
+                    <a:latin typeface="Cambria" panose="02040503050406030204" pitchFamily="18" charset="0"/>
+                    <a:ea typeface="Cambria" panose="02040503050406030204" pitchFamily="18" charset="0"/>
+                    <a:cs typeface="Times New Roman" panose="02020603050405020304" pitchFamily="18" charset="0"/>
+                  </a:rPr>
+                  <a:t> </a:t>
+                </a:r>
+                <a:r>
+                  <a:rPr lang="fr-FR" sz="1600" i="1" kern="100" dirty="0" err="1">
+                    <a:latin typeface="Cambria" panose="02040503050406030204" pitchFamily="18" charset="0"/>
+                    <a:ea typeface="Cambria" panose="02040503050406030204" pitchFamily="18" charset="0"/>
+                    <a:cs typeface="Times New Roman" panose="02020603050405020304" pitchFamily="18" charset="0"/>
+                  </a:rPr>
+                  <a:t>reaction</a:t>
+                </a:r>
+                <a:r>
+                  <a:rPr lang="fr-FR" sz="1600" i="1" kern="100" dirty="0">
+                    <a:latin typeface="Cambria" panose="02040503050406030204" pitchFamily="18" charset="0"/>
+                    <a:ea typeface="Cambria" panose="02040503050406030204" pitchFamily="18" charset="0"/>
+                    <a:cs typeface="Times New Roman" panose="02020603050405020304" pitchFamily="18" charset="0"/>
+                  </a:rPr>
+                  <a:t> 0 to R, and g </a:t>
+                </a:r>
+                <a:r>
+                  <a:rPr lang="fr-FR" sz="1600" i="1" kern="100" dirty="0" err="1">
+                    <a:latin typeface="Cambria" panose="02040503050406030204" pitchFamily="18" charset="0"/>
+                    <a:ea typeface="Cambria" panose="02040503050406030204" pitchFamily="18" charset="0"/>
+                    <a:cs typeface="Times New Roman" panose="02020603050405020304" pitchFamily="18" charset="0"/>
+                  </a:rPr>
+                  <a:t>going</a:t>
+                </a:r>
+                <a:r>
+                  <a:rPr lang="fr-FR" sz="1600" i="1" kern="100" dirty="0">
+                    <a:latin typeface="Cambria" panose="02040503050406030204" pitchFamily="18" charset="0"/>
+                    <a:ea typeface="Cambria" panose="02040503050406030204" pitchFamily="18" charset="0"/>
+                    <a:cs typeface="Times New Roman" panose="02020603050405020304" pitchFamily="18" charset="0"/>
+                  </a:rPr>
+                  <a:t> </a:t>
+                </a:r>
+                <a:r>
+                  <a:rPr lang="fr-FR" sz="1600" i="1" kern="100" dirty="0" err="1">
+                    <a:latin typeface="Cambria" panose="02040503050406030204" pitchFamily="18" charset="0"/>
+                    <a:ea typeface="Cambria" panose="02040503050406030204" pitchFamily="18" charset="0"/>
+                    <a:cs typeface="Times New Roman" panose="02020603050405020304" pitchFamily="18" charset="0"/>
+                  </a:rPr>
+                  <a:t>from</a:t>
+                </a:r>
+                <a:r>
+                  <a:rPr lang="fr-FR" sz="1600" i="1" kern="100" dirty="0">
+                    <a:latin typeface="Cambria" panose="02040503050406030204" pitchFamily="18" charset="0"/>
+                    <a:ea typeface="Cambria" panose="02040503050406030204" pitchFamily="18" charset="0"/>
+                    <a:cs typeface="Times New Roman" panose="02020603050405020304" pitchFamily="18" charset="0"/>
+                  </a:rPr>
+                  <a:t> </a:t>
+                </a:r>
+                <a:r>
+                  <a:rPr lang="fr-FR" sz="1600" i="1" kern="100" dirty="0" err="1">
+                    <a:latin typeface="Cambria" panose="02040503050406030204" pitchFamily="18" charset="0"/>
+                    <a:ea typeface="Cambria" panose="02040503050406030204" pitchFamily="18" charset="0"/>
+                    <a:cs typeface="Times New Roman" panose="02020603050405020304" pitchFamily="18" charset="0"/>
+                  </a:rPr>
+                  <a:t>energy</a:t>
+                </a:r>
+                <a:r>
+                  <a:rPr lang="fr-FR" sz="1600" i="1" kern="100" dirty="0">
+                    <a:latin typeface="Cambria" panose="02040503050406030204" pitchFamily="18" charset="0"/>
+                    <a:ea typeface="Cambria" panose="02040503050406030204" pitchFamily="18" charset="0"/>
+                    <a:cs typeface="Times New Roman" panose="02020603050405020304" pitchFamily="18" charset="0"/>
+                  </a:rPr>
+                  <a:t> group 0 to G ; for </a:t>
+                </a:r>
+                <a:r>
+                  <a:rPr lang="fr-FR" sz="1600" i="1" kern="100" dirty="0" err="1">
+                    <a:latin typeface="Cambria" panose="02040503050406030204" pitchFamily="18" charset="0"/>
+                    <a:ea typeface="Cambria" panose="02040503050406030204" pitchFamily="18" charset="0"/>
+                    <a:cs typeface="Times New Roman" panose="02020603050405020304" pitchFamily="18" charset="0"/>
+                  </a:rPr>
+                  <a:t>each</a:t>
+                </a:r>
+                <a:r>
+                  <a:rPr lang="fr-FR" sz="1600" i="1" kern="100" dirty="0">
+                    <a:latin typeface="Cambria" panose="02040503050406030204" pitchFamily="18" charset="0"/>
+                    <a:ea typeface="Cambria" panose="02040503050406030204" pitchFamily="18" charset="0"/>
+                    <a:cs typeface="Times New Roman" panose="02020603050405020304" pitchFamily="18" charset="0"/>
+                  </a:rPr>
+                  <a:t> benchmark index j </a:t>
+                </a:r>
+                <a:r>
+                  <a:rPr lang="fr-FR" sz="1600" i="1" kern="100" dirty="0" err="1">
+                    <a:latin typeface="Cambria" panose="02040503050406030204" pitchFamily="18" charset="0"/>
+                    <a:ea typeface="Cambria" panose="02040503050406030204" pitchFamily="18" charset="0"/>
+                    <a:cs typeface="Times New Roman" panose="02020603050405020304" pitchFamily="18" charset="0"/>
+                  </a:rPr>
+                  <a:t>going</a:t>
+                </a:r>
+                <a:r>
+                  <a:rPr lang="fr-FR" sz="1600" i="1" kern="100" dirty="0">
+                    <a:latin typeface="Cambria" panose="02040503050406030204" pitchFamily="18" charset="0"/>
+                    <a:ea typeface="Cambria" panose="02040503050406030204" pitchFamily="18" charset="0"/>
+                    <a:cs typeface="Times New Roman" panose="02020603050405020304" pitchFamily="18" charset="0"/>
+                  </a:rPr>
+                  <a:t> </a:t>
+                </a:r>
+                <a:r>
+                  <a:rPr lang="fr-FR" sz="1600" i="1" kern="100" dirty="0" err="1">
+                    <a:latin typeface="Cambria" panose="02040503050406030204" pitchFamily="18" charset="0"/>
+                    <a:ea typeface="Cambria" panose="02040503050406030204" pitchFamily="18" charset="0"/>
+                    <a:cs typeface="Times New Roman" panose="02020603050405020304" pitchFamily="18" charset="0"/>
+                  </a:rPr>
+                  <a:t>from</a:t>
+                </a:r>
+                <a:r>
+                  <a:rPr lang="fr-FR" sz="1600" i="1" kern="100" dirty="0">
+                    <a:latin typeface="Cambria" panose="02040503050406030204" pitchFamily="18" charset="0"/>
+                    <a:ea typeface="Cambria" panose="02040503050406030204" pitchFamily="18" charset="0"/>
+                    <a:cs typeface="Times New Roman" panose="02020603050405020304" pitchFamily="18" charset="0"/>
+                  </a:rPr>
+                  <a:t> 0 to J.</a:t>
+                </a:r>
+                <a:endParaRPr lang="fr-FR" sz="1600" kern="100" dirty="0">
                   <a:latin typeface="Cambria" panose="02040503050406030204" pitchFamily="18" charset="0"/>
                   <a:ea typeface="Cambria" panose="02040503050406030204" pitchFamily="18" charset="0"/>
                   <a:cs typeface="Times New Roman" panose="02020603050405020304" pitchFamily="18" charset="0"/>
@@ -27915,7 +29118,7 @@
             </p:txBody>
           </p:sp>
         </mc:Choice>
-        <mc:Fallback xmlns="">
+        <mc:Fallback>
           <p:sp>
             <p:nvSpPr>
               <p:cNvPr id="21" name="TextBox 20">
@@ -27932,8 +29135,8 @@
             </p:nvSpPr>
             <p:spPr>
               <a:xfrm>
-                <a:off x="2009107" y="5484517"/>
-                <a:ext cx="9920554" cy="1249381"/>
+                <a:off x="1866936" y="5502717"/>
+                <a:ext cx="9920554" cy="1029641"/>
               </a:xfrm>
               <a:prstGeom prst="rect">
                 <a:avLst/>
@@ -27941,7 +29144,7 @@
               <a:blipFill>
                 <a:blip r:embed="rId3"/>
                 <a:stretch>
-                  <a:fillRect b="-5797"/>
+                  <a:fillRect b="-5848"/>
                 </a:stretch>
               </a:blipFill>
               <a:ln w="12700">
@@ -27955,7 +29158,7 @@
               <a:lstStyle/>
               <a:p>
                 <a:r>
-                  <a:rPr lang="fr-FR">
+                  <a:rPr lang="en-US">
                     <a:noFill/>
                   </a:rPr>
                   <a:t> </a:t>
@@ -28109,7 +29312,91 @@
                 <a:ea typeface="Cambria" panose="02040503050406030204" pitchFamily="18" charset="0"/>
                 <a:cs typeface="Times New Roman" panose="02020603050405020304" pitchFamily="18" charset="0"/>
               </a:rPr>
-              <a:t>liste cas benchmarks/vecteurs de sensibilité :</a:t>
+              <a:t>Benchmark cases </a:t>
+            </a:r>
+            <a:r>
+              <a:rPr lang="fr-FR" sz="1600" u="sng" spc="300" dirty="0" err="1">
+                <a:solidFill>
+                  <a:schemeClr val="accent1">
+                    <a:lumMod val="60000"/>
+                    <a:lumOff val="40000"/>
+                  </a:schemeClr>
+                </a:solidFill>
+                <a:latin typeface="Cambria" panose="02040503050406030204" pitchFamily="18" charset="0"/>
+                <a:ea typeface="Cambria" panose="02040503050406030204" pitchFamily="18" charset="0"/>
+                <a:cs typeface="Times New Roman" panose="02020603050405020304" pitchFamily="18" charset="0"/>
+              </a:rPr>
+              <a:t>list</a:t>
+            </a:r>
+            <a:r>
+              <a:rPr lang="fr-FR" sz="1600" u="sng" spc="300" dirty="0">
+                <a:solidFill>
+                  <a:schemeClr val="accent1">
+                    <a:lumMod val="60000"/>
+                    <a:lumOff val="40000"/>
+                  </a:schemeClr>
+                </a:solidFill>
+                <a:latin typeface="Cambria" panose="02040503050406030204" pitchFamily="18" charset="0"/>
+                <a:ea typeface="Cambria" panose="02040503050406030204" pitchFamily="18" charset="0"/>
+                <a:cs typeface="Times New Roman" panose="02020603050405020304" pitchFamily="18" charset="0"/>
+              </a:rPr>
+              <a:t>/</a:t>
+            </a:r>
+            <a:r>
+              <a:rPr lang="fr-FR" sz="1600" u="sng" spc="300" dirty="0" err="1">
+                <a:solidFill>
+                  <a:schemeClr val="accent1">
+                    <a:lumMod val="60000"/>
+                    <a:lumOff val="40000"/>
+                  </a:schemeClr>
+                </a:solidFill>
+                <a:latin typeface="Cambria" panose="02040503050406030204" pitchFamily="18" charset="0"/>
+                <a:ea typeface="Cambria" panose="02040503050406030204" pitchFamily="18" charset="0"/>
+                <a:cs typeface="Times New Roman" panose="02020603050405020304" pitchFamily="18" charset="0"/>
+              </a:rPr>
+              <a:t>sensitivity</a:t>
+            </a:r>
+            <a:r>
+              <a:rPr lang="fr-FR" sz="1600" u="sng" spc="300" dirty="0">
+                <a:solidFill>
+                  <a:schemeClr val="accent1">
+                    <a:lumMod val="60000"/>
+                    <a:lumOff val="40000"/>
+                  </a:schemeClr>
+                </a:solidFill>
+                <a:latin typeface="Cambria" panose="02040503050406030204" pitchFamily="18" charset="0"/>
+                <a:ea typeface="Cambria" panose="02040503050406030204" pitchFamily="18" charset="0"/>
+                <a:cs typeface="Times New Roman" panose="02020603050405020304" pitchFamily="18" charset="0"/>
+              </a:rPr>
+              <a:t> </a:t>
+            </a:r>
+            <a:r>
+              <a:rPr lang="fr-FR" sz="1600" u="sng" spc="300" dirty="0" err="1">
+                <a:solidFill>
+                  <a:schemeClr val="accent1">
+                    <a:lumMod val="60000"/>
+                    <a:lumOff val="40000"/>
+                  </a:schemeClr>
+                </a:solidFill>
+                <a:latin typeface="Cambria" panose="02040503050406030204" pitchFamily="18" charset="0"/>
+                <a:ea typeface="Cambria" panose="02040503050406030204" pitchFamily="18" charset="0"/>
+                <a:cs typeface="Times New Roman" panose="02020603050405020304" pitchFamily="18" charset="0"/>
+              </a:rPr>
+              <a:t>vectors</a:t>
+            </a:r>
+            <a:r>
+              <a:rPr lang="fr-FR" sz="1600" u="sng" spc="300" dirty="0">
+                <a:solidFill>
+                  <a:schemeClr val="accent1">
+                    <a:lumMod val="60000"/>
+                    <a:lumOff val="40000"/>
+                  </a:schemeClr>
+                </a:solidFill>
+                <a:latin typeface="Cambria" panose="02040503050406030204" pitchFamily="18" charset="0"/>
+                <a:ea typeface="Cambria" panose="02040503050406030204" pitchFamily="18" charset="0"/>
+                <a:cs typeface="Times New Roman" panose="02020603050405020304" pitchFamily="18" charset="0"/>
+              </a:rPr>
+              <a:t>:</a:t>
             </a:r>
           </a:p>
         </p:txBody>

</xml_diff>